<commit_message>
actualización mapa conceptual tema 11 de matemáticas 7
</commit_message>
<xml_diff>
--- a/fuentes/contenidos/grado07/guion11/MapaConceptual_MA_07_11_CO.pptx
+++ b/fuentes/contenidos/grado07/guion11/MapaConceptual_MA_07_11_CO.pptx
@@ -6,7 +6,6 @@
   </p:sldMasterIdLst>
   <p:sldIdLst>
     <p:sldId id="256" r:id="rId2"/>
-    <p:sldId id="257" r:id="rId3"/>
   </p:sldIdLst>
   <p:sldSz cx="9144000" cy="6858000" type="letter"/>
   <p:notesSz cx="6794500" cy="9918700"/>
@@ -463,7 +462,7 @@
             <a:fld id="{5001C876-01F7-4317-94B9-1AE222133113}" type="datetimeFigureOut">
               <a:rPr lang="es-ES" smtClean="0"/>
               <a:pPr/>
-              <a:t>10/12/2015</a:t>
+              <a:t>26/02/2016</a:t>
             </a:fld>
             <a:endParaRPr lang="es-ES"/>
           </a:p>
@@ -1047,7 +1046,7 @@
         </p:nvSpPr>
         <p:spPr>
           <a:xfrm>
-            <a:off x="1911731" y="78445"/>
+            <a:off x="1935794" y="547676"/>
             <a:ext cx="5679731" cy="352691"/>
           </a:xfrm>
           <a:prstGeom prst="rect">
@@ -1106,7 +1105,7 @@
         </p:nvCxnSpPr>
         <p:spPr>
           <a:xfrm rot="5400000">
-            <a:off x="3645004" y="455771"/>
+            <a:off x="3669067" y="925002"/>
             <a:ext cx="147749" cy="2058157"/>
           </a:xfrm>
           <a:prstGeom prst="bentConnector3">
@@ -1143,8 +1142,8 @@
         </p:nvSpPr>
         <p:spPr>
           <a:xfrm>
-            <a:off x="444583" y="2448759"/>
-            <a:ext cx="1307653" cy="343441"/>
+            <a:off x="468646" y="2917990"/>
+            <a:ext cx="1308642" cy="393588"/>
           </a:xfrm>
           <a:prstGeom prst="rect">
             <a:avLst/>
@@ -1187,7 +1186,27 @@
                 <a:latin typeface="Arial" panose="020B0604020202020204" pitchFamily="34" charset="0"/>
                 <a:cs typeface="Arial" panose="020B0604020202020204" pitchFamily="34" charset="0"/>
               </a:rPr>
-              <a:t>Las unidades del sistema métrico</a:t>
+              <a:t>unidades </a:t>
+            </a:r>
+            <a:r>
+              <a:rPr lang="es-ES" sz="900" dirty="0" smtClean="0">
+                <a:solidFill>
+                  <a:schemeClr val="tx1"/>
+                </a:solidFill>
+                <a:latin typeface="Arial" panose="020B0604020202020204" pitchFamily="34" charset="0"/>
+                <a:cs typeface="Arial" panose="020B0604020202020204" pitchFamily="34" charset="0"/>
+              </a:rPr>
+              <a:t>del sistema </a:t>
+            </a:r>
+            <a:r>
+              <a:rPr lang="es-ES" sz="900" dirty="0" smtClean="0">
+                <a:solidFill>
+                  <a:schemeClr val="tx1"/>
+                </a:solidFill>
+                <a:latin typeface="Arial" panose="020B0604020202020204" pitchFamily="34" charset="0"/>
+                <a:cs typeface="Arial" panose="020B0604020202020204" pitchFamily="34" charset="0"/>
+              </a:rPr>
+              <a:t>métrico decimal</a:t>
             </a:r>
             <a:endParaRPr lang="es-ES" sz="900" dirty="0">
               <a:solidFill>
@@ -1207,249 +1226,8 @@
         </p:nvCxnSpPr>
         <p:spPr>
           <a:xfrm rot="16200000" flipH="1">
-            <a:off x="8132468" y="2339190"/>
+            <a:off x="8156531" y="2808421"/>
             <a:ext cx="143029" cy="877"/>
-          </a:xfrm>
-          <a:prstGeom prst="bentConnector3">
-            <a:avLst>
-              <a:gd name="adj1" fmla="val 50000"/>
-            </a:avLst>
-          </a:prstGeom>
-          <a:ln w="12700">
-            <a:solidFill>
-              <a:schemeClr val="tx1"/>
-            </a:solidFill>
-          </a:ln>
-        </p:spPr>
-        <p:style>
-          <a:lnRef idx="1">
-            <a:schemeClr val="accent1"/>
-          </a:lnRef>
-          <a:fillRef idx="0">
-            <a:schemeClr val="accent1"/>
-          </a:fillRef>
-          <a:effectRef idx="0">
-            <a:schemeClr val="accent1"/>
-          </a:effectRef>
-          <a:fontRef idx="minor">
-            <a:schemeClr val="tx1"/>
-          </a:fontRef>
-        </p:style>
-      </p:cxnSp>
-      <p:sp>
-        <p:nvSpPr>
-          <p:cNvPr id="211" name="Rectángulo 210" descr="Nodo de sexto nivel"/>
-          <p:cNvSpPr/>
-          <p:nvPr/>
-        </p:nvSpPr>
-        <p:spPr>
-          <a:xfrm>
-            <a:off x="1009481" y="9125292"/>
-            <a:ext cx="1118927" cy="353519"/>
-          </a:xfrm>
-          <a:prstGeom prst="rect">
-            <a:avLst/>
-          </a:prstGeom>
-          <a:solidFill>
-            <a:schemeClr val="bg1"/>
-          </a:solidFill>
-          <a:ln>
-            <a:solidFill>
-              <a:schemeClr val="tx1"/>
-            </a:solidFill>
-          </a:ln>
-        </p:spPr>
-        <p:style>
-          <a:lnRef idx="2">
-            <a:schemeClr val="accent6"/>
-          </a:lnRef>
-          <a:fillRef idx="1">
-            <a:schemeClr val="lt1"/>
-          </a:fillRef>
-          <a:effectRef idx="0">
-            <a:schemeClr val="accent6"/>
-          </a:effectRef>
-          <a:fontRef idx="minor">
-            <a:schemeClr val="dk1"/>
-          </a:fontRef>
-        </p:style>
-        <p:txBody>
-          <a:bodyPr rtlCol="0" anchor="ctr"/>
-          <a:lstStyle/>
-          <a:p>
-            <a:pPr algn="ctr"/>
-            <a:r>
-              <a:rPr lang="es-ES" sz="900" dirty="0" smtClean="0">
-                <a:solidFill>
-                  <a:schemeClr val="tx1"/>
-                </a:solidFill>
-                <a:latin typeface="Arial" panose="020B0604020202020204" pitchFamily="34" charset="0"/>
-                <a:cs typeface="Arial" panose="020B0604020202020204" pitchFamily="34" charset="0"/>
-              </a:rPr>
-              <a:t>nodo de sexto nivel</a:t>
-            </a:r>
-            <a:endParaRPr lang="es-ES" sz="900" dirty="0">
-              <a:solidFill>
-                <a:schemeClr val="tx1"/>
-              </a:solidFill>
-              <a:latin typeface="Arial" panose="020B0604020202020204" pitchFamily="34" charset="0"/>
-              <a:cs typeface="Arial" panose="020B0604020202020204" pitchFamily="34" charset="0"/>
-            </a:endParaRPr>
-          </a:p>
-        </p:txBody>
-      </p:sp>
-      <p:sp>
-        <p:nvSpPr>
-          <p:cNvPr id="212" name="Rectángulo 211" descr="Nodo de séptimo nivel"/>
-          <p:cNvSpPr/>
-          <p:nvPr/>
-        </p:nvSpPr>
-        <p:spPr>
-          <a:xfrm>
-            <a:off x="1009481" y="9995697"/>
-            <a:ext cx="1118927" cy="353519"/>
-          </a:xfrm>
-          <a:prstGeom prst="rect">
-            <a:avLst/>
-          </a:prstGeom>
-          <a:solidFill>
-            <a:schemeClr val="bg1"/>
-          </a:solidFill>
-          <a:ln>
-            <a:solidFill>
-              <a:schemeClr val="tx1"/>
-            </a:solidFill>
-          </a:ln>
-        </p:spPr>
-        <p:style>
-          <a:lnRef idx="2">
-            <a:schemeClr val="accent6"/>
-          </a:lnRef>
-          <a:fillRef idx="1">
-            <a:schemeClr val="lt1"/>
-          </a:fillRef>
-          <a:effectRef idx="0">
-            <a:schemeClr val="accent6"/>
-          </a:effectRef>
-          <a:fontRef idx="minor">
-            <a:schemeClr val="dk1"/>
-          </a:fontRef>
-        </p:style>
-        <p:txBody>
-          <a:bodyPr rtlCol="0" anchor="ctr"/>
-          <a:lstStyle/>
-          <a:p>
-            <a:pPr algn="ctr"/>
-            <a:r>
-              <a:rPr lang="es-ES" sz="900" dirty="0" smtClean="0">
-                <a:solidFill>
-                  <a:schemeClr val="tx1"/>
-                </a:solidFill>
-                <a:latin typeface="Arial" panose="020B0604020202020204" pitchFamily="34" charset="0"/>
-                <a:cs typeface="Arial" panose="020B0604020202020204" pitchFamily="34" charset="0"/>
-              </a:rPr>
-              <a:t>nodo de séptimo nivel</a:t>
-            </a:r>
-            <a:endParaRPr lang="es-ES" sz="900" dirty="0">
-              <a:solidFill>
-                <a:schemeClr val="tx1"/>
-              </a:solidFill>
-              <a:latin typeface="Arial" panose="020B0604020202020204" pitchFamily="34" charset="0"/>
-              <a:cs typeface="Arial" panose="020B0604020202020204" pitchFamily="34" charset="0"/>
-            </a:endParaRPr>
-          </a:p>
-        </p:txBody>
-      </p:sp>
-      <p:sp>
-        <p:nvSpPr>
-          <p:cNvPr id="244" name="CuadroTexto 243" descr="Conector entre nodos"/>
-          <p:cNvSpPr txBox="1"/>
-          <p:nvPr/>
-        </p:nvSpPr>
-        <p:spPr>
-          <a:xfrm>
-            <a:off x="1006571" y="9642178"/>
-            <a:ext cx="1120084" cy="230832"/>
-          </a:xfrm>
-          <a:prstGeom prst="rect">
-            <a:avLst/>
-          </a:prstGeom>
-          <a:noFill/>
-        </p:spPr>
-        <p:txBody>
-          <a:bodyPr wrap="square" rtlCol="0">
-            <a:spAutoFit/>
-          </a:bodyPr>
-          <a:lstStyle/>
-          <a:p>
-            <a:pPr algn="ctr"/>
-            <a:r>
-              <a:rPr lang="es-ES" sz="900" dirty="0" smtClean="0">
-                <a:latin typeface="Arial" panose="020B0604020202020204" pitchFamily="34" charset="0"/>
-                <a:cs typeface="Arial" panose="020B0604020202020204" pitchFamily="34" charset="0"/>
-              </a:rPr>
-              <a:t>conector</a:t>
-            </a:r>
-            <a:endParaRPr lang="es-ES" sz="900" dirty="0">
-              <a:latin typeface="Arial" panose="020B0604020202020204" pitchFamily="34" charset="0"/>
-              <a:cs typeface="Arial" panose="020B0604020202020204" pitchFamily="34" charset="0"/>
-            </a:endParaRPr>
-          </a:p>
-        </p:txBody>
-      </p:sp>
-      <p:cxnSp>
-        <p:nvCxnSpPr>
-          <p:cNvPr id="251" name="Conector angular 250"/>
-          <p:cNvCxnSpPr>
-            <a:stCxn id="244" idx="0"/>
-            <a:endCxn id="211" idx="2"/>
-          </p:cNvCxnSpPr>
-          <p:nvPr/>
-        </p:nvCxnSpPr>
-        <p:spPr>
-          <a:xfrm rot="5400000" flipH="1" flipV="1">
-            <a:off x="1486096" y="9559329"/>
-            <a:ext cx="163367" cy="2332"/>
-          </a:xfrm>
-          <a:prstGeom prst="bentConnector3">
-            <a:avLst>
-              <a:gd name="adj1" fmla="val 50000"/>
-            </a:avLst>
-          </a:prstGeom>
-          <a:ln w="12700">
-            <a:solidFill>
-              <a:schemeClr val="tx1"/>
-            </a:solidFill>
-          </a:ln>
-        </p:spPr>
-        <p:style>
-          <a:lnRef idx="1">
-            <a:schemeClr val="accent1"/>
-          </a:lnRef>
-          <a:fillRef idx="0">
-            <a:schemeClr val="accent1"/>
-          </a:fillRef>
-          <a:effectRef idx="0">
-            <a:schemeClr val="accent1"/>
-          </a:effectRef>
-          <a:fontRef idx="minor">
-            <a:schemeClr val="tx1"/>
-          </a:fontRef>
-        </p:style>
-      </p:cxnSp>
-      <p:cxnSp>
-        <p:nvCxnSpPr>
-          <p:cNvPr id="254" name="Conector angular 253"/>
-          <p:cNvCxnSpPr>
-            <a:stCxn id="212" idx="0"/>
-            <a:endCxn id="244" idx="2"/>
-          </p:cNvCxnSpPr>
-          <p:nvPr/>
-        </p:nvCxnSpPr>
-        <p:spPr>
-          <a:xfrm rot="16200000" flipV="1">
-            <a:off x="1506436" y="9933188"/>
-            <a:ext cx="122687" cy="2332"/>
           </a:xfrm>
           <a:prstGeom prst="bentConnector3">
             <a:avLst>
@@ -1485,7 +1263,7 @@
         </p:nvSpPr>
         <p:spPr>
           <a:xfrm>
-            <a:off x="1283442" y="2077691"/>
+            <a:off x="1307505" y="2546922"/>
             <a:ext cx="1122431" cy="230832"/>
           </a:xfrm>
           <a:prstGeom prst="rect">
@@ -1505,7 +1283,14 @@
                 <a:latin typeface="Arial" panose="020B0604020202020204" pitchFamily="34" charset="0"/>
                 <a:cs typeface="Arial" panose="020B0604020202020204" pitchFamily="34" charset="0"/>
               </a:rPr>
-              <a:t>se emplean</a:t>
+              <a:t>se </a:t>
+            </a:r>
+            <a:r>
+              <a:rPr lang="es-ES" sz="900" dirty="0" smtClean="0">
+                <a:latin typeface="Arial" panose="020B0604020202020204" pitchFamily="34" charset="0"/>
+                <a:cs typeface="Arial" panose="020B0604020202020204" pitchFamily="34" charset="0"/>
+              </a:rPr>
+              <a:t>mide en</a:t>
             </a:r>
             <a:endParaRPr lang="es-ES" sz="900" dirty="0">
               <a:latin typeface="Arial" panose="020B0604020202020204" pitchFamily="34" charset="0"/>
@@ -1516,138 +1301,14 @@
       </p:sp>
       <p:sp>
         <p:nvSpPr>
-          <p:cNvPr id="266" name="Rectángulo 265" descr="Nodo de sexto nivel"/>
-          <p:cNvSpPr/>
+          <p:cNvPr id="274" name="CuadroTexto 273" descr="Conector entre nodos"/>
+          <p:cNvSpPr txBox="1"/>
           <p:nvPr/>
         </p:nvSpPr>
         <p:spPr>
           <a:xfrm>
-            <a:off x="3142210" y="9125292"/>
-            <a:ext cx="1118927" cy="353519"/>
-          </a:xfrm>
-          <a:prstGeom prst="rect">
-            <a:avLst/>
-          </a:prstGeom>
-          <a:solidFill>
-            <a:schemeClr val="bg1"/>
-          </a:solidFill>
-          <a:ln>
-            <a:solidFill>
-              <a:schemeClr val="tx1"/>
-            </a:solidFill>
-          </a:ln>
-        </p:spPr>
-        <p:style>
-          <a:lnRef idx="2">
-            <a:schemeClr val="accent6"/>
-          </a:lnRef>
-          <a:fillRef idx="1">
-            <a:schemeClr val="lt1"/>
-          </a:fillRef>
-          <a:effectRef idx="0">
-            <a:schemeClr val="accent6"/>
-          </a:effectRef>
-          <a:fontRef idx="minor">
-            <a:schemeClr val="dk1"/>
-          </a:fontRef>
-        </p:style>
-        <p:txBody>
-          <a:bodyPr rtlCol="0" anchor="ctr"/>
-          <a:lstStyle/>
-          <a:p>
-            <a:pPr algn="ctr"/>
-            <a:r>
-              <a:rPr lang="es-ES" sz="900" dirty="0" smtClean="0">
-                <a:solidFill>
-                  <a:schemeClr val="tx1"/>
-                </a:solidFill>
-                <a:latin typeface="Arial" panose="020B0604020202020204" pitchFamily="34" charset="0"/>
-                <a:cs typeface="Arial" panose="020B0604020202020204" pitchFamily="34" charset="0"/>
-              </a:rPr>
-              <a:t>nodo de sexto nivel</a:t>
-            </a:r>
-            <a:endParaRPr lang="es-ES" sz="900" dirty="0">
-              <a:solidFill>
-                <a:schemeClr val="tx1"/>
-              </a:solidFill>
-              <a:latin typeface="Arial" panose="020B0604020202020204" pitchFamily="34" charset="0"/>
-              <a:cs typeface="Arial" panose="020B0604020202020204" pitchFamily="34" charset="0"/>
-            </a:endParaRPr>
-          </a:p>
-        </p:txBody>
-      </p:sp>
-      <p:sp>
-        <p:nvSpPr>
-          <p:cNvPr id="267" name="Rectángulo 266" descr="Nodo de séptimo nivel"/>
-          <p:cNvSpPr/>
-          <p:nvPr/>
-        </p:nvSpPr>
-        <p:spPr>
-          <a:xfrm>
-            <a:off x="3142210" y="9995697"/>
-            <a:ext cx="1118927" cy="353519"/>
-          </a:xfrm>
-          <a:prstGeom prst="rect">
-            <a:avLst/>
-          </a:prstGeom>
-          <a:solidFill>
-            <a:schemeClr val="bg1"/>
-          </a:solidFill>
-          <a:ln>
-            <a:solidFill>
-              <a:schemeClr val="tx1"/>
-            </a:solidFill>
-          </a:ln>
-        </p:spPr>
-        <p:style>
-          <a:lnRef idx="2">
-            <a:schemeClr val="accent6"/>
-          </a:lnRef>
-          <a:fillRef idx="1">
-            <a:schemeClr val="lt1"/>
-          </a:fillRef>
-          <a:effectRef idx="0">
-            <a:schemeClr val="accent6"/>
-          </a:effectRef>
-          <a:fontRef idx="minor">
-            <a:schemeClr val="dk1"/>
-          </a:fontRef>
-        </p:style>
-        <p:txBody>
-          <a:bodyPr rtlCol="0" anchor="ctr"/>
-          <a:lstStyle/>
-          <a:p>
-            <a:pPr algn="ctr"/>
-            <a:r>
-              <a:rPr lang="es-ES" sz="900" dirty="0" smtClean="0">
-                <a:solidFill>
-                  <a:schemeClr val="tx1"/>
-                </a:solidFill>
-                <a:latin typeface="Arial" panose="020B0604020202020204" pitchFamily="34" charset="0"/>
-                <a:cs typeface="Arial" panose="020B0604020202020204" pitchFamily="34" charset="0"/>
-              </a:rPr>
-              <a:t>nodo de séptimo nivel</a:t>
-            </a:r>
-            <a:endParaRPr lang="es-ES" sz="900" dirty="0">
-              <a:solidFill>
-                <a:schemeClr val="tx1"/>
-              </a:solidFill>
-              <a:latin typeface="Arial" panose="020B0604020202020204" pitchFamily="34" charset="0"/>
-              <a:cs typeface="Arial" panose="020B0604020202020204" pitchFamily="34" charset="0"/>
-            </a:endParaRPr>
-          </a:p>
-        </p:txBody>
-      </p:sp>
-      <p:sp>
-        <p:nvSpPr>
-          <p:cNvPr id="269" name="CuadroTexto 268" descr="Conector entre nodos"/>
-          <p:cNvSpPr txBox="1"/>
-          <p:nvPr/>
-        </p:nvSpPr>
-        <p:spPr>
-          <a:xfrm>
-            <a:off x="3139300" y="9642178"/>
-            <a:ext cx="1120084" cy="230832"/>
+            <a:off x="4214443" y="922472"/>
+            <a:ext cx="1122431" cy="230832"/>
           </a:xfrm>
           <a:prstGeom prst="rect">
             <a:avLst/>
@@ -1666,188 +1327,9 @@
                 <a:latin typeface="Arial" panose="020B0604020202020204" pitchFamily="34" charset="0"/>
                 <a:cs typeface="Arial" panose="020B0604020202020204" pitchFamily="34" charset="0"/>
               </a:rPr>
-              <a:t>conector</a:t>
+              <a:t>son</a:t>
             </a:r>
             <a:endParaRPr lang="es-ES" sz="900" dirty="0">
-              <a:latin typeface="Arial" panose="020B0604020202020204" pitchFamily="34" charset="0"/>
-              <a:cs typeface="Arial" panose="020B0604020202020204" pitchFamily="34" charset="0"/>
-            </a:endParaRPr>
-          </a:p>
-        </p:txBody>
-      </p:sp>
-      <p:cxnSp>
-        <p:nvCxnSpPr>
-          <p:cNvPr id="272" name="Conector angular 271"/>
-          <p:cNvCxnSpPr>
-            <a:stCxn id="269" idx="0"/>
-            <a:endCxn id="266" idx="2"/>
-          </p:cNvCxnSpPr>
-          <p:nvPr/>
-        </p:nvCxnSpPr>
-        <p:spPr>
-          <a:xfrm rot="5400000" flipH="1" flipV="1">
-            <a:off x="3618825" y="9559329"/>
-            <a:ext cx="163367" cy="2332"/>
-          </a:xfrm>
-          <a:prstGeom prst="bentConnector3">
-            <a:avLst>
-              <a:gd name="adj1" fmla="val 50000"/>
-            </a:avLst>
-          </a:prstGeom>
-          <a:ln w="12700">
-            <a:solidFill>
-              <a:schemeClr val="tx1"/>
-            </a:solidFill>
-          </a:ln>
-        </p:spPr>
-        <p:style>
-          <a:lnRef idx="1">
-            <a:schemeClr val="accent1"/>
-          </a:lnRef>
-          <a:fillRef idx="0">
-            <a:schemeClr val="accent1"/>
-          </a:fillRef>
-          <a:effectRef idx="0">
-            <a:schemeClr val="accent1"/>
-          </a:effectRef>
-          <a:fontRef idx="minor">
-            <a:schemeClr val="tx1"/>
-          </a:fontRef>
-        </p:style>
-      </p:cxnSp>
-      <p:cxnSp>
-        <p:nvCxnSpPr>
-          <p:cNvPr id="273" name="Conector angular 272"/>
-          <p:cNvCxnSpPr>
-            <a:stCxn id="267" idx="0"/>
-            <a:endCxn id="269" idx="2"/>
-          </p:cNvCxnSpPr>
-          <p:nvPr/>
-        </p:nvCxnSpPr>
-        <p:spPr>
-          <a:xfrm rot="16200000" flipV="1">
-            <a:off x="3639165" y="9933188"/>
-            <a:ext cx="122687" cy="2332"/>
-          </a:xfrm>
-          <a:prstGeom prst="bentConnector3">
-            <a:avLst>
-              <a:gd name="adj1" fmla="val 50000"/>
-            </a:avLst>
-          </a:prstGeom>
-          <a:ln w="12700">
-            <a:solidFill>
-              <a:schemeClr val="tx1"/>
-            </a:solidFill>
-          </a:ln>
-        </p:spPr>
-        <p:style>
-          <a:lnRef idx="1">
-            <a:schemeClr val="accent1"/>
-          </a:lnRef>
-          <a:fillRef idx="0">
-            <a:schemeClr val="accent1"/>
-          </a:fillRef>
-          <a:effectRef idx="0">
-            <a:schemeClr val="accent1"/>
-          </a:effectRef>
-          <a:fontRef idx="minor">
-            <a:schemeClr val="tx1"/>
-          </a:fontRef>
-        </p:style>
-      </p:cxnSp>
-      <p:sp>
-        <p:nvSpPr>
-          <p:cNvPr id="274" name="CuadroTexto 273" descr="Conector entre nodos"/>
-          <p:cNvSpPr txBox="1"/>
-          <p:nvPr/>
-        </p:nvSpPr>
-        <p:spPr>
-          <a:xfrm>
-            <a:off x="4190380" y="453241"/>
-            <a:ext cx="1122431" cy="230832"/>
-          </a:xfrm>
-          <a:prstGeom prst="rect">
-            <a:avLst/>
-          </a:prstGeom>
-          <a:noFill/>
-        </p:spPr>
-        <p:txBody>
-          <a:bodyPr wrap="square" rtlCol="0">
-            <a:spAutoFit/>
-          </a:bodyPr>
-          <a:lstStyle/>
-          <a:p>
-            <a:pPr algn="ctr"/>
-            <a:r>
-              <a:rPr lang="es-ES" sz="900" dirty="0" smtClean="0">
-                <a:latin typeface="Arial" panose="020B0604020202020204" pitchFamily="34" charset="0"/>
-                <a:cs typeface="Arial" panose="020B0604020202020204" pitchFamily="34" charset="0"/>
-              </a:rPr>
-              <a:t>son</a:t>
-            </a:r>
-            <a:endParaRPr lang="es-ES" sz="900" dirty="0">
-              <a:latin typeface="Arial" panose="020B0604020202020204" pitchFamily="34" charset="0"/>
-              <a:cs typeface="Arial" panose="020B0604020202020204" pitchFamily="34" charset="0"/>
-            </a:endParaRPr>
-          </a:p>
-        </p:txBody>
-      </p:sp>
-      <p:sp>
-        <p:nvSpPr>
-          <p:cNvPr id="309" name="Rectángulo 308" descr="Nodo de quinto nivel"/>
-          <p:cNvSpPr/>
-          <p:nvPr/>
-        </p:nvSpPr>
-        <p:spPr>
-          <a:xfrm>
-            <a:off x="5447938" y="9248514"/>
-            <a:ext cx="1118927" cy="353519"/>
-          </a:xfrm>
-          <a:prstGeom prst="rect">
-            <a:avLst/>
-          </a:prstGeom>
-          <a:solidFill>
-            <a:schemeClr val="bg1"/>
-          </a:solidFill>
-          <a:ln>
-            <a:solidFill>
-              <a:schemeClr val="tx1"/>
-            </a:solidFill>
-          </a:ln>
-        </p:spPr>
-        <p:style>
-          <a:lnRef idx="2">
-            <a:schemeClr val="accent6"/>
-          </a:lnRef>
-          <a:fillRef idx="1">
-            <a:schemeClr val="lt1"/>
-          </a:fillRef>
-          <a:effectRef idx="0">
-            <a:schemeClr val="accent6"/>
-          </a:effectRef>
-          <a:fontRef idx="minor">
-            <a:schemeClr val="dk1"/>
-          </a:fontRef>
-        </p:style>
-        <p:txBody>
-          <a:bodyPr rtlCol="0" anchor="ctr"/>
-          <a:lstStyle/>
-          <a:p>
-            <a:pPr algn="ctr"/>
-            <a:r>
-              <a:rPr lang="es-ES" sz="900" dirty="0" smtClean="0">
-                <a:solidFill>
-                  <a:schemeClr val="tx1"/>
-                </a:solidFill>
-                <a:latin typeface="Arial" panose="020B0604020202020204" pitchFamily="34" charset="0"/>
-                <a:cs typeface="Arial" panose="020B0604020202020204" pitchFamily="34" charset="0"/>
-              </a:rPr>
-              <a:t>nodo de quinto nivel</a:t>
-            </a:r>
-            <a:endParaRPr lang="es-ES" sz="900" dirty="0">
-              <a:solidFill>
-                <a:schemeClr val="tx1"/>
-              </a:solidFill>
               <a:latin typeface="Arial" panose="020B0604020202020204" pitchFamily="34" charset="0"/>
               <a:cs typeface="Arial" panose="020B0604020202020204" pitchFamily="34" charset="0"/>
             </a:endParaRPr>
@@ -1865,249 +1347,8 @@
         </p:nvCxnSpPr>
         <p:spPr>
           <a:xfrm rot="16200000" flipH="1">
-            <a:off x="5528781" y="630150"/>
+            <a:off x="5552844" y="1099381"/>
             <a:ext cx="143631" cy="1705280"/>
-          </a:xfrm>
-          <a:prstGeom prst="bentConnector3">
-            <a:avLst>
-              <a:gd name="adj1" fmla="val 50000"/>
-            </a:avLst>
-          </a:prstGeom>
-          <a:ln w="12700">
-            <a:solidFill>
-              <a:schemeClr val="tx1"/>
-            </a:solidFill>
-          </a:ln>
-        </p:spPr>
-        <p:style>
-          <a:lnRef idx="1">
-            <a:schemeClr val="accent1"/>
-          </a:lnRef>
-          <a:fillRef idx="0">
-            <a:schemeClr val="accent1"/>
-          </a:fillRef>
-          <a:effectRef idx="0">
-            <a:schemeClr val="accent1"/>
-          </a:effectRef>
-          <a:fontRef idx="minor">
-            <a:schemeClr val="tx1"/>
-          </a:fontRef>
-        </p:style>
-      </p:cxnSp>
-      <p:sp>
-        <p:nvSpPr>
-          <p:cNvPr id="353" name="Rectángulo 352" descr="Nodo de sexto nivel"/>
-          <p:cNvSpPr/>
-          <p:nvPr/>
-        </p:nvSpPr>
-        <p:spPr>
-          <a:xfrm>
-            <a:off x="7638605" y="9125291"/>
-            <a:ext cx="1118927" cy="353519"/>
-          </a:xfrm>
-          <a:prstGeom prst="rect">
-            <a:avLst/>
-          </a:prstGeom>
-          <a:solidFill>
-            <a:schemeClr val="bg1"/>
-          </a:solidFill>
-          <a:ln>
-            <a:solidFill>
-              <a:schemeClr val="tx1"/>
-            </a:solidFill>
-          </a:ln>
-        </p:spPr>
-        <p:style>
-          <a:lnRef idx="2">
-            <a:schemeClr val="accent6"/>
-          </a:lnRef>
-          <a:fillRef idx="1">
-            <a:schemeClr val="lt1"/>
-          </a:fillRef>
-          <a:effectRef idx="0">
-            <a:schemeClr val="accent6"/>
-          </a:effectRef>
-          <a:fontRef idx="minor">
-            <a:schemeClr val="dk1"/>
-          </a:fontRef>
-        </p:style>
-        <p:txBody>
-          <a:bodyPr rtlCol="0" anchor="ctr"/>
-          <a:lstStyle/>
-          <a:p>
-            <a:pPr algn="ctr"/>
-            <a:r>
-              <a:rPr lang="es-ES" sz="900" dirty="0" smtClean="0">
-                <a:solidFill>
-                  <a:schemeClr val="tx1"/>
-                </a:solidFill>
-                <a:latin typeface="Arial" panose="020B0604020202020204" pitchFamily="34" charset="0"/>
-                <a:cs typeface="Arial" panose="020B0604020202020204" pitchFamily="34" charset="0"/>
-              </a:rPr>
-              <a:t>nodo de sexto nivel</a:t>
-            </a:r>
-            <a:endParaRPr lang="es-ES" sz="900" dirty="0">
-              <a:solidFill>
-                <a:schemeClr val="tx1"/>
-              </a:solidFill>
-              <a:latin typeface="Arial" panose="020B0604020202020204" pitchFamily="34" charset="0"/>
-              <a:cs typeface="Arial" panose="020B0604020202020204" pitchFamily="34" charset="0"/>
-            </a:endParaRPr>
-          </a:p>
-        </p:txBody>
-      </p:sp>
-      <p:sp>
-        <p:nvSpPr>
-          <p:cNvPr id="354" name="Rectángulo 353" descr="Nodo de séptimo nivel"/>
-          <p:cNvSpPr/>
-          <p:nvPr/>
-        </p:nvSpPr>
-        <p:spPr>
-          <a:xfrm>
-            <a:off x="7638605" y="9995696"/>
-            <a:ext cx="1118927" cy="353519"/>
-          </a:xfrm>
-          <a:prstGeom prst="rect">
-            <a:avLst/>
-          </a:prstGeom>
-          <a:solidFill>
-            <a:schemeClr val="bg1"/>
-          </a:solidFill>
-          <a:ln>
-            <a:solidFill>
-              <a:schemeClr val="tx1"/>
-            </a:solidFill>
-          </a:ln>
-        </p:spPr>
-        <p:style>
-          <a:lnRef idx="2">
-            <a:schemeClr val="accent6"/>
-          </a:lnRef>
-          <a:fillRef idx="1">
-            <a:schemeClr val="lt1"/>
-          </a:fillRef>
-          <a:effectRef idx="0">
-            <a:schemeClr val="accent6"/>
-          </a:effectRef>
-          <a:fontRef idx="minor">
-            <a:schemeClr val="dk1"/>
-          </a:fontRef>
-        </p:style>
-        <p:txBody>
-          <a:bodyPr rtlCol="0" anchor="ctr"/>
-          <a:lstStyle/>
-          <a:p>
-            <a:pPr algn="ctr"/>
-            <a:r>
-              <a:rPr lang="es-ES" sz="900" dirty="0" smtClean="0">
-                <a:solidFill>
-                  <a:schemeClr val="tx1"/>
-                </a:solidFill>
-                <a:latin typeface="Arial" panose="020B0604020202020204" pitchFamily="34" charset="0"/>
-                <a:cs typeface="Arial" panose="020B0604020202020204" pitchFamily="34" charset="0"/>
-              </a:rPr>
-              <a:t>nodo de séptimo nivel</a:t>
-            </a:r>
-            <a:endParaRPr lang="es-ES" sz="900" dirty="0">
-              <a:solidFill>
-                <a:schemeClr val="tx1"/>
-              </a:solidFill>
-              <a:latin typeface="Arial" panose="020B0604020202020204" pitchFamily="34" charset="0"/>
-              <a:cs typeface="Arial" panose="020B0604020202020204" pitchFamily="34" charset="0"/>
-            </a:endParaRPr>
-          </a:p>
-        </p:txBody>
-      </p:sp>
-      <p:sp>
-        <p:nvSpPr>
-          <p:cNvPr id="356" name="CuadroTexto 355" descr="Conector entre nodos"/>
-          <p:cNvSpPr txBox="1"/>
-          <p:nvPr/>
-        </p:nvSpPr>
-        <p:spPr>
-          <a:xfrm>
-            <a:off x="7635695" y="9642177"/>
-            <a:ext cx="1120084" cy="230832"/>
-          </a:xfrm>
-          <a:prstGeom prst="rect">
-            <a:avLst/>
-          </a:prstGeom>
-          <a:noFill/>
-        </p:spPr>
-        <p:txBody>
-          <a:bodyPr wrap="square" rtlCol="0">
-            <a:spAutoFit/>
-          </a:bodyPr>
-          <a:lstStyle/>
-          <a:p>
-            <a:pPr algn="ctr"/>
-            <a:r>
-              <a:rPr lang="es-ES" sz="900" dirty="0" smtClean="0">
-                <a:latin typeface="Arial" panose="020B0604020202020204" pitchFamily="34" charset="0"/>
-                <a:cs typeface="Arial" panose="020B0604020202020204" pitchFamily="34" charset="0"/>
-              </a:rPr>
-              <a:t>conector</a:t>
-            </a:r>
-            <a:endParaRPr lang="es-ES" sz="900" dirty="0">
-              <a:latin typeface="Arial" panose="020B0604020202020204" pitchFamily="34" charset="0"/>
-              <a:cs typeface="Arial" panose="020B0604020202020204" pitchFamily="34" charset="0"/>
-            </a:endParaRPr>
-          </a:p>
-        </p:txBody>
-      </p:sp>
-      <p:cxnSp>
-        <p:nvCxnSpPr>
-          <p:cNvPr id="359" name="Conector angular 358"/>
-          <p:cNvCxnSpPr>
-            <a:stCxn id="356" idx="0"/>
-            <a:endCxn id="353" idx="2"/>
-          </p:cNvCxnSpPr>
-          <p:nvPr/>
-        </p:nvCxnSpPr>
-        <p:spPr>
-          <a:xfrm rot="5400000" flipH="1" flipV="1">
-            <a:off x="8115220" y="9559328"/>
-            <a:ext cx="163367" cy="2332"/>
-          </a:xfrm>
-          <a:prstGeom prst="bentConnector3">
-            <a:avLst>
-              <a:gd name="adj1" fmla="val 50000"/>
-            </a:avLst>
-          </a:prstGeom>
-          <a:ln w="12700">
-            <a:solidFill>
-              <a:schemeClr val="tx1"/>
-            </a:solidFill>
-          </a:ln>
-        </p:spPr>
-        <p:style>
-          <a:lnRef idx="1">
-            <a:schemeClr val="accent1"/>
-          </a:lnRef>
-          <a:fillRef idx="0">
-            <a:schemeClr val="accent1"/>
-          </a:fillRef>
-          <a:effectRef idx="0">
-            <a:schemeClr val="accent1"/>
-          </a:effectRef>
-          <a:fontRef idx="minor">
-            <a:schemeClr val="tx1"/>
-          </a:fontRef>
-        </p:style>
-      </p:cxnSp>
-      <p:cxnSp>
-        <p:nvCxnSpPr>
-          <p:cNvPr id="360" name="Conector angular 359"/>
-          <p:cNvCxnSpPr>
-            <a:stCxn id="354" idx="0"/>
-            <a:endCxn id="356" idx="2"/>
-          </p:cNvCxnSpPr>
-          <p:nvPr/>
-        </p:nvCxnSpPr>
-        <p:spPr>
-          <a:xfrm rot="16200000" flipV="1">
-            <a:off x="8135560" y="9933187"/>
-            <a:ext cx="122687" cy="2332"/>
           </a:xfrm>
           <a:prstGeom prst="bentConnector3">
             <a:avLst>
@@ -2143,7 +1384,7 @@
         </p:nvSpPr>
         <p:spPr>
           <a:xfrm>
-            <a:off x="5555131" y="2102013"/>
+            <a:off x="5579194" y="2571244"/>
             <a:ext cx="1122431" cy="230832"/>
           </a:xfrm>
           <a:prstGeom prst="rect">
@@ -2170,7 +1411,14 @@
                 <a:latin typeface="Arial" panose="020B0604020202020204" pitchFamily="34" charset="0"/>
                 <a:cs typeface="Arial" panose="020B0604020202020204" pitchFamily="34" charset="0"/>
               </a:rPr>
-              <a:t>e emplean</a:t>
+              <a:t>e </a:t>
+            </a:r>
+            <a:r>
+              <a:rPr lang="es-ES" sz="900" dirty="0" smtClean="0">
+                <a:latin typeface="Arial" panose="020B0604020202020204" pitchFamily="34" charset="0"/>
+                <a:cs typeface="Arial" panose="020B0604020202020204" pitchFamily="34" charset="0"/>
+              </a:rPr>
+              <a:t>mide en</a:t>
             </a:r>
             <a:endParaRPr lang="es-ES" sz="900" dirty="0">
               <a:latin typeface="Arial" panose="020B0604020202020204" pitchFamily="34" charset="0"/>
@@ -2189,7 +1437,7 @@
         </p:nvCxnSpPr>
         <p:spPr>
           <a:xfrm flipH="1">
-            <a:off x="4751595" y="431136"/>
+            <a:off x="4775658" y="900367"/>
             <a:ext cx="2" cy="72000"/>
           </a:xfrm>
           <a:prstGeom prst="line">
@@ -2220,7 +1468,7 @@
         </p:nvSpPr>
         <p:spPr>
           <a:xfrm>
-            <a:off x="4072054" y="738706"/>
+            <a:off x="4096117" y="1207937"/>
             <a:ext cx="1375884" cy="376148"/>
           </a:xfrm>
           <a:prstGeom prst="rect">
@@ -2283,7 +1531,7 @@
         </p:nvCxnSpPr>
         <p:spPr>
           <a:xfrm flipH="1">
-            <a:off x="4755444" y="665485"/>
+            <a:off x="4779507" y="1134716"/>
             <a:ext cx="2" cy="72000"/>
           </a:xfrm>
           <a:prstGeom prst="line">
@@ -2314,7 +1562,7 @@
         </p:nvCxnSpPr>
         <p:spPr>
           <a:xfrm flipH="1">
-            <a:off x="4748111" y="1134800"/>
+            <a:off x="4772174" y="1604031"/>
             <a:ext cx="2" cy="72000"/>
           </a:xfrm>
           <a:prstGeom prst="line">
@@ -2345,7 +1593,7 @@
         </p:nvSpPr>
         <p:spPr>
           <a:xfrm>
-            <a:off x="2072568" y="1558724"/>
+            <a:off x="2096631" y="2027955"/>
             <a:ext cx="1234461" cy="357473"/>
           </a:xfrm>
           <a:prstGeom prst="rect">
@@ -2389,7 +1637,17 @@
                 <a:latin typeface="Arial" panose="020B0604020202020204" pitchFamily="34" charset="0"/>
                 <a:cs typeface="Arial" panose="020B0604020202020204" pitchFamily="34" charset="0"/>
               </a:rPr>
-              <a:t>La distancia entre dos puntos</a:t>
+              <a:t>la </a:t>
+            </a:r>
+            <a:r>
+              <a:rPr lang="es-ES" sz="1050" dirty="0" smtClean="0">
+                <a:solidFill>
+                  <a:schemeClr val="bg1"/>
+                </a:solidFill>
+                <a:latin typeface="Arial" panose="020B0604020202020204" pitchFamily="34" charset="0"/>
+                <a:cs typeface="Arial" panose="020B0604020202020204" pitchFamily="34" charset="0"/>
+              </a:rPr>
+              <a:t>distancia entre dos puntos</a:t>
             </a:r>
             <a:endParaRPr lang="es-ES" sz="1050" dirty="0">
               <a:solidFill>
@@ -2409,7 +1667,7 @@
         </p:nvSpPr>
         <p:spPr>
           <a:xfrm>
-            <a:off x="5785326" y="1554606"/>
+            <a:off x="5809389" y="2023837"/>
             <a:ext cx="1335819" cy="357473"/>
           </a:xfrm>
           <a:prstGeom prst="rect">
@@ -2453,7 +1711,17 @@
                 <a:latin typeface="Arial" panose="020B0604020202020204" pitchFamily="34" charset="0"/>
                 <a:cs typeface="Arial" panose="020B0604020202020204" pitchFamily="34" charset="0"/>
               </a:rPr>
-              <a:t>La superficie de una región plana</a:t>
+              <a:t>la </a:t>
+            </a:r>
+            <a:r>
+              <a:rPr lang="es-ES" sz="1050" dirty="0" smtClean="0">
+                <a:solidFill>
+                  <a:schemeClr val="bg1"/>
+                </a:solidFill>
+                <a:latin typeface="Arial" panose="020B0604020202020204" pitchFamily="34" charset="0"/>
+                <a:cs typeface="Arial" panose="020B0604020202020204" pitchFamily="34" charset="0"/>
+              </a:rPr>
+              <a:t>superficie de una región plana</a:t>
             </a:r>
             <a:endParaRPr lang="es-ES" sz="1050" dirty="0">
               <a:solidFill>
@@ -2473,7 +1741,7 @@
         </p:nvSpPr>
         <p:spPr>
           <a:xfrm>
-            <a:off x="4186740" y="1180143"/>
+            <a:off x="4210803" y="1649374"/>
             <a:ext cx="1122431" cy="230832"/>
           </a:xfrm>
           <a:prstGeom prst="rect">
@@ -2510,7 +1778,7 @@
         </p:nvSpPr>
         <p:spPr>
           <a:xfrm>
-            <a:off x="3430497" y="2448759"/>
+            <a:off x="3454560" y="2917990"/>
             <a:ext cx="1122431" cy="343441"/>
           </a:xfrm>
           <a:prstGeom prst="rect">
@@ -2554,7 +1822,17 @@
                 <a:latin typeface="Arial" panose="020B0604020202020204" pitchFamily="34" charset="0"/>
                 <a:cs typeface="Arial" panose="020B0604020202020204" pitchFamily="34" charset="0"/>
               </a:rPr>
-              <a:t>Calcular perímetros</a:t>
+              <a:t>calcular </a:t>
+            </a:r>
+            <a:r>
+              <a:rPr lang="es-ES" sz="900" dirty="0" smtClean="0">
+                <a:solidFill>
+                  <a:schemeClr val="tx1"/>
+                </a:solidFill>
+                <a:latin typeface="Arial" panose="020B0604020202020204" pitchFamily="34" charset="0"/>
+                <a:cs typeface="Arial" panose="020B0604020202020204" pitchFamily="34" charset="0"/>
+              </a:rPr>
+              <a:t>perímetros</a:t>
             </a:r>
             <a:endParaRPr lang="es-ES" sz="900" dirty="0">
               <a:solidFill>
@@ -2574,7 +1852,7 @@
         </p:nvSpPr>
         <p:spPr>
           <a:xfrm>
-            <a:off x="2021361" y="2445756"/>
+            <a:off x="2045424" y="2914987"/>
             <a:ext cx="1122431" cy="343441"/>
           </a:xfrm>
           <a:prstGeom prst="rect">
@@ -2618,7 +1896,17 @@
                 <a:latin typeface="Arial" panose="020B0604020202020204" pitchFamily="34" charset="0"/>
                 <a:cs typeface="Arial" panose="020B0604020202020204" pitchFamily="34" charset="0"/>
               </a:rPr>
-              <a:t>Las unidades del sistema inglés</a:t>
+              <a:t>unidades </a:t>
+            </a:r>
+            <a:r>
+              <a:rPr lang="es-ES" sz="900" dirty="0" smtClean="0">
+                <a:solidFill>
+                  <a:schemeClr val="tx1"/>
+                </a:solidFill>
+                <a:latin typeface="Arial" panose="020B0604020202020204" pitchFamily="34" charset="0"/>
+                <a:cs typeface="Arial" panose="020B0604020202020204" pitchFamily="34" charset="0"/>
+              </a:rPr>
+              <a:t>del sistema inglés</a:t>
             </a:r>
             <a:endParaRPr lang="es-ES" sz="900" dirty="0">
               <a:solidFill>
@@ -2638,8 +1926,8 @@
         </p:nvSpPr>
         <p:spPr>
           <a:xfrm>
-            <a:off x="4883539" y="2491348"/>
-            <a:ext cx="1122431" cy="343441"/>
+            <a:off x="4907602" y="2960579"/>
+            <a:ext cx="1154961" cy="415863"/>
           </a:xfrm>
           <a:prstGeom prst="rect">
             <a:avLst/>
@@ -2682,7 +1970,27 @@
                 <a:latin typeface="Arial" panose="020B0604020202020204" pitchFamily="34" charset="0"/>
                 <a:cs typeface="Arial" panose="020B0604020202020204" pitchFamily="34" charset="0"/>
               </a:rPr>
-              <a:t>Las unidades del sistema métrico</a:t>
+              <a:t>unidades </a:t>
+            </a:r>
+            <a:r>
+              <a:rPr lang="es-ES" sz="900" dirty="0" smtClean="0">
+                <a:solidFill>
+                  <a:schemeClr val="tx1"/>
+                </a:solidFill>
+                <a:latin typeface="Arial" panose="020B0604020202020204" pitchFamily="34" charset="0"/>
+                <a:cs typeface="Arial" panose="020B0604020202020204" pitchFamily="34" charset="0"/>
+              </a:rPr>
+              <a:t>del sistema </a:t>
+            </a:r>
+            <a:r>
+              <a:rPr lang="es-ES" sz="900" dirty="0" smtClean="0">
+                <a:solidFill>
+                  <a:schemeClr val="tx1"/>
+                </a:solidFill>
+                <a:latin typeface="Arial" panose="020B0604020202020204" pitchFamily="34" charset="0"/>
+                <a:cs typeface="Arial" panose="020B0604020202020204" pitchFamily="34" charset="0"/>
+              </a:rPr>
+              <a:t>métrico decimal</a:t>
             </a:r>
             <a:endParaRPr lang="es-ES" sz="900" dirty="0">
               <a:solidFill>
@@ -2702,7 +2010,7 @@
         </p:nvSpPr>
         <p:spPr>
           <a:xfrm>
-            <a:off x="6292675" y="2491348"/>
+            <a:off x="6316738" y="2960579"/>
             <a:ext cx="1122431" cy="343441"/>
           </a:xfrm>
           <a:prstGeom prst="rect">
@@ -2746,7 +2054,17 @@
                 <a:latin typeface="Arial" panose="020B0604020202020204" pitchFamily="34" charset="0"/>
                 <a:cs typeface="Arial" panose="020B0604020202020204" pitchFamily="34" charset="0"/>
               </a:rPr>
-              <a:t>Las unidades agrarias</a:t>
+              <a:t>unidades </a:t>
+            </a:r>
+            <a:r>
+              <a:rPr lang="es-ES" sz="900" dirty="0" smtClean="0">
+                <a:solidFill>
+                  <a:schemeClr val="tx1"/>
+                </a:solidFill>
+                <a:latin typeface="Arial" panose="020B0604020202020204" pitchFamily="34" charset="0"/>
+                <a:cs typeface="Arial" panose="020B0604020202020204" pitchFamily="34" charset="0"/>
+              </a:rPr>
+              <a:t>agrarias</a:t>
             </a:r>
             <a:endParaRPr lang="es-ES" sz="900" dirty="0">
               <a:solidFill>
@@ -2766,7 +2084,7 @@
         </p:nvSpPr>
         <p:spPr>
           <a:xfrm>
-            <a:off x="3412918" y="2073897"/>
+            <a:off x="3436981" y="2543128"/>
             <a:ext cx="1122431" cy="230832"/>
           </a:xfrm>
           <a:prstGeom prst="rect">
@@ -2803,7 +2121,7 @@
         </p:nvSpPr>
         <p:spPr>
           <a:xfrm>
-            <a:off x="7642328" y="2092444"/>
+            <a:off x="7666391" y="2561675"/>
             <a:ext cx="1122431" cy="230832"/>
           </a:xfrm>
           <a:prstGeom prst="rect">
@@ -2823,7 +2141,7 @@
                 <a:latin typeface="Arial" panose="020B0604020202020204" pitchFamily="34" charset="0"/>
                 <a:cs typeface="Arial" panose="020B0604020202020204" pitchFamily="34" charset="0"/>
               </a:rPr>
-              <a:t>como</a:t>
+              <a:t>se calcula en</a:t>
             </a:r>
             <a:endParaRPr lang="es-ES" sz="900" dirty="0">
               <a:latin typeface="Arial" panose="020B0604020202020204" pitchFamily="34" charset="0"/>
@@ -2840,7 +2158,7 @@
         </p:nvSpPr>
         <p:spPr>
           <a:xfrm>
-            <a:off x="7666652" y="2398244"/>
+            <a:off x="7690715" y="2867475"/>
             <a:ext cx="1122431" cy="343441"/>
           </a:xfrm>
           <a:prstGeom prst="rect">
@@ -2884,7 +2202,17 @@
                 <a:latin typeface="Arial" panose="020B0604020202020204" pitchFamily="34" charset="0"/>
                 <a:cs typeface="Arial" panose="020B0604020202020204" pitchFamily="34" charset="0"/>
               </a:rPr>
-              <a:t>Las figuras geométricas</a:t>
+              <a:t>figuras </a:t>
+            </a:r>
+            <a:r>
+              <a:rPr lang="es-ES" sz="900" dirty="0" smtClean="0">
+                <a:solidFill>
+                  <a:schemeClr val="tx1"/>
+                </a:solidFill>
+                <a:latin typeface="Arial" panose="020B0604020202020204" pitchFamily="34" charset="0"/>
+                <a:cs typeface="Arial" panose="020B0604020202020204" pitchFamily="34" charset="0"/>
+              </a:rPr>
+              <a:t>geométricas</a:t>
             </a:r>
             <a:endParaRPr lang="es-ES" sz="900" dirty="0">
               <a:solidFill>
@@ -2904,7 +2232,7 @@
         </p:nvSpPr>
         <p:spPr>
           <a:xfrm>
-            <a:off x="550682" y="3123590"/>
+            <a:off x="556853" y="3700627"/>
             <a:ext cx="1117184" cy="1970149"/>
           </a:xfrm>
           <a:prstGeom prst="rect">
@@ -3208,7 +2536,7 @@
         </p:nvCxnSpPr>
         <p:spPr>
           <a:xfrm rot="5400000">
-            <a:off x="2186482" y="1574374"/>
+            <a:off x="2210545" y="2043605"/>
             <a:ext cx="161494" cy="845141"/>
           </a:xfrm>
           <a:prstGeom prst="bentConnector3">
@@ -3248,7 +2576,7 @@
         </p:nvCxnSpPr>
         <p:spPr>
           <a:xfrm rot="16200000" flipH="1">
-            <a:off x="3253116" y="1352879"/>
+            <a:off x="3277179" y="1822110"/>
             <a:ext cx="157700" cy="1284335"/>
           </a:xfrm>
           <a:prstGeom prst="bentConnector3">
@@ -3288,7 +2616,7 @@
         </p:nvCxnSpPr>
         <p:spPr>
           <a:xfrm rot="5400000">
-            <a:off x="6189825" y="1838602"/>
+            <a:off x="6213888" y="2307833"/>
             <a:ext cx="189934" cy="336889"/>
           </a:xfrm>
           <a:prstGeom prst="bentConnector3">
@@ -3320,15 +2648,12 @@
       <p:cxnSp>
         <p:nvCxnSpPr>
           <p:cNvPr id="180" name="Conector angular 179"/>
-          <p:cNvCxnSpPr>
-            <a:stCxn id="129" idx="2"/>
-            <a:endCxn id="153" idx="0"/>
-          </p:cNvCxnSpPr>
+          <p:cNvCxnSpPr/>
           <p:nvPr/>
         </p:nvCxnSpPr>
         <p:spPr>
           <a:xfrm rot="16200000" flipH="1">
-            <a:off x="7238208" y="1127107"/>
+            <a:off x="7266898" y="1601123"/>
             <a:ext cx="180365" cy="1750308"/>
           </a:xfrm>
           <a:prstGeom prst="bentConnector3">
@@ -3362,14 +2687,13 @@
           <p:cNvPr id="189" name="Conector angular 188"/>
           <p:cNvCxnSpPr>
             <a:stCxn id="130" idx="2"/>
-            <a:endCxn id="72" idx="0"/>
           </p:cNvCxnSpPr>
           <p:nvPr/>
         </p:nvCxnSpPr>
         <p:spPr>
           <a:xfrm rot="5400000">
-            <a:off x="1401416" y="2005517"/>
-            <a:ext cx="140236" cy="746248"/>
+            <a:off x="1425726" y="2474995"/>
+            <a:ext cx="140236" cy="745754"/>
           </a:xfrm>
           <a:prstGeom prst="bentConnector3">
             <a:avLst>
@@ -3408,7 +2732,7 @@
         </p:nvCxnSpPr>
         <p:spPr>
           <a:xfrm rot="16200000" flipV="1">
-            <a:off x="2145002" y="2008180"/>
+            <a:off x="2169065" y="2477411"/>
             <a:ext cx="137233" cy="737919"/>
           </a:xfrm>
           <a:prstGeom prst="bentConnector3">
@@ -3445,7 +2769,7 @@
         </p:nvCxnSpPr>
         <p:spPr>
           <a:xfrm rot="16200000" flipH="1">
-            <a:off x="3895858" y="2374629"/>
+            <a:off x="3919921" y="2843860"/>
             <a:ext cx="143029" cy="877"/>
           </a:xfrm>
           <a:prstGeom prst="bentConnector3">
@@ -3485,8 +2809,8 @@
         </p:nvCxnSpPr>
         <p:spPr>
           <a:xfrm rot="5400000">
-            <a:off x="5701300" y="2076300"/>
-            <a:ext cx="158503" cy="671592"/>
+            <a:off x="5733496" y="2553664"/>
+            <a:ext cx="158503" cy="655327"/>
           </a:xfrm>
           <a:prstGeom prst="bentConnector3">
             <a:avLst>
@@ -3525,7 +2849,7 @@
         </p:nvCxnSpPr>
         <p:spPr>
           <a:xfrm rot="16200000" flipV="1">
-            <a:off x="6405868" y="2043325"/>
+            <a:off x="6429931" y="2512556"/>
             <a:ext cx="158503" cy="737544"/>
           </a:xfrm>
           <a:prstGeom prst="bentConnector3">
@@ -3562,7 +2886,7 @@
         </p:nvSpPr>
         <p:spPr>
           <a:xfrm>
-            <a:off x="576205" y="2842348"/>
+            <a:off x="555723" y="3351994"/>
             <a:ext cx="1117174" cy="230832"/>
           </a:xfrm>
           <a:prstGeom prst="rect">
@@ -3599,7 +2923,7 @@
         </p:nvSpPr>
         <p:spPr>
           <a:xfrm>
-            <a:off x="4926534" y="3123590"/>
+            <a:off x="4901012" y="3721370"/>
             <a:ext cx="1130452" cy="2097762"/>
           </a:xfrm>
           <a:prstGeom prst="rect">
@@ -3644,7 +2968,17 @@
                 <a:latin typeface="Arial" panose="020B0604020202020204" pitchFamily="34" charset="0"/>
                 <a:cs typeface="Arial" panose="020B0604020202020204" pitchFamily="34" charset="0"/>
               </a:rPr>
-              <a:t>El kilómetro cuadrado</a:t>
+              <a:t>el </a:t>
+            </a:r>
+            <a:r>
+              <a:rPr lang="es-ES" sz="900" dirty="0" smtClean="0">
+                <a:solidFill>
+                  <a:schemeClr val="tx1"/>
+                </a:solidFill>
+                <a:latin typeface="Arial" panose="020B0604020202020204" pitchFamily="34" charset="0"/>
+                <a:cs typeface="Arial" panose="020B0604020202020204" pitchFamily="34" charset="0"/>
+              </a:rPr>
+              <a:t>kilómetro cuadrado</a:t>
             </a:r>
           </a:p>
           <a:p>
@@ -3660,7 +2994,17 @@
                 <a:latin typeface="Arial" panose="020B0604020202020204" pitchFamily="34" charset="0"/>
                 <a:cs typeface="Arial" panose="020B0604020202020204" pitchFamily="34" charset="0"/>
               </a:rPr>
-              <a:t>El hectómetro cuadrado</a:t>
+              <a:t>el </a:t>
+            </a:r>
+            <a:r>
+              <a:rPr lang="es-ES" sz="900" dirty="0" smtClean="0">
+                <a:solidFill>
+                  <a:schemeClr val="tx1"/>
+                </a:solidFill>
+                <a:latin typeface="Arial" panose="020B0604020202020204" pitchFamily="34" charset="0"/>
+                <a:cs typeface="Arial" panose="020B0604020202020204" pitchFamily="34" charset="0"/>
+              </a:rPr>
+              <a:t>hectómetro cuadrado</a:t>
             </a:r>
           </a:p>
           <a:p>
@@ -3676,7 +3020,17 @@
                 <a:latin typeface="Arial" panose="020B0604020202020204" pitchFamily="34" charset="0"/>
                 <a:cs typeface="Arial" panose="020B0604020202020204" pitchFamily="34" charset="0"/>
               </a:rPr>
-              <a:t>El decámetro cuadrado</a:t>
+              <a:t>el </a:t>
+            </a:r>
+            <a:r>
+              <a:rPr lang="es-ES" sz="900" dirty="0" smtClean="0">
+                <a:solidFill>
+                  <a:schemeClr val="tx1"/>
+                </a:solidFill>
+                <a:latin typeface="Arial" panose="020B0604020202020204" pitchFamily="34" charset="0"/>
+                <a:cs typeface="Arial" panose="020B0604020202020204" pitchFamily="34" charset="0"/>
+              </a:rPr>
+              <a:t>decámetro cuadrado</a:t>
             </a:r>
           </a:p>
           <a:p>
@@ -3692,7 +3046,17 @@
                 <a:latin typeface="Arial" panose="020B0604020202020204" pitchFamily="34" charset="0"/>
                 <a:cs typeface="Arial" panose="020B0604020202020204" pitchFamily="34" charset="0"/>
               </a:rPr>
-              <a:t>El metro cuadrado</a:t>
+              <a:t>el </a:t>
+            </a:r>
+            <a:r>
+              <a:rPr lang="es-ES" sz="900" dirty="0" smtClean="0">
+                <a:solidFill>
+                  <a:schemeClr val="tx1"/>
+                </a:solidFill>
+                <a:latin typeface="Arial" panose="020B0604020202020204" pitchFamily="34" charset="0"/>
+                <a:cs typeface="Arial" panose="020B0604020202020204" pitchFamily="34" charset="0"/>
+              </a:rPr>
+              <a:t>metro cuadrado</a:t>
             </a:r>
           </a:p>
           <a:p>
@@ -3708,7 +3072,17 @@
                 <a:latin typeface="Arial" panose="020B0604020202020204" pitchFamily="34" charset="0"/>
                 <a:cs typeface="Arial" panose="020B0604020202020204" pitchFamily="34" charset="0"/>
               </a:rPr>
-              <a:t>El decímetro cuadrado</a:t>
+              <a:t>el </a:t>
+            </a:r>
+            <a:r>
+              <a:rPr lang="es-ES" sz="900" dirty="0" smtClean="0">
+                <a:solidFill>
+                  <a:schemeClr val="tx1"/>
+                </a:solidFill>
+                <a:latin typeface="Arial" panose="020B0604020202020204" pitchFamily="34" charset="0"/>
+                <a:cs typeface="Arial" panose="020B0604020202020204" pitchFamily="34" charset="0"/>
+              </a:rPr>
+              <a:t>decímetro cuadrado</a:t>
             </a:r>
           </a:p>
           <a:p>
@@ -3724,7 +3098,17 @@
                 <a:latin typeface="Arial" panose="020B0604020202020204" pitchFamily="34" charset="0"/>
                 <a:cs typeface="Arial" panose="020B0604020202020204" pitchFamily="34" charset="0"/>
               </a:rPr>
-              <a:t>El centímetro cuadrado</a:t>
+              <a:t>el </a:t>
+            </a:r>
+            <a:r>
+              <a:rPr lang="es-ES" sz="900" dirty="0" smtClean="0">
+                <a:solidFill>
+                  <a:schemeClr val="tx1"/>
+                </a:solidFill>
+                <a:latin typeface="Arial" panose="020B0604020202020204" pitchFamily="34" charset="0"/>
+                <a:cs typeface="Arial" panose="020B0604020202020204" pitchFamily="34" charset="0"/>
+              </a:rPr>
+              <a:t>centímetro cuadrado</a:t>
             </a:r>
           </a:p>
           <a:p>
@@ -3740,7 +3124,17 @@
                 <a:latin typeface="Arial" panose="020B0604020202020204" pitchFamily="34" charset="0"/>
                 <a:cs typeface="Arial" panose="020B0604020202020204" pitchFamily="34" charset="0"/>
               </a:rPr>
-              <a:t>El milímetro cuadrado</a:t>
+              <a:t>el </a:t>
+            </a:r>
+            <a:r>
+              <a:rPr lang="es-ES" sz="900" dirty="0" smtClean="0">
+                <a:solidFill>
+                  <a:schemeClr val="tx1"/>
+                </a:solidFill>
+                <a:latin typeface="Arial" panose="020B0604020202020204" pitchFamily="34" charset="0"/>
+                <a:cs typeface="Arial" panose="020B0604020202020204" pitchFamily="34" charset="0"/>
+              </a:rPr>
+              <a:t>milímetro cuadrado</a:t>
             </a:r>
             <a:endParaRPr lang="es-ES" sz="900" dirty="0">
               <a:solidFill>
@@ -3760,7 +3154,7 @@
         </p:nvSpPr>
         <p:spPr>
           <a:xfrm>
-            <a:off x="6365029" y="3120854"/>
+            <a:off x="6389092" y="3590085"/>
             <a:ext cx="1000556" cy="628627"/>
           </a:xfrm>
           <a:prstGeom prst="rect">
@@ -3857,7 +3251,7 @@
         </p:nvSpPr>
         <p:spPr>
           <a:xfrm>
-            <a:off x="2088333" y="3097490"/>
+            <a:off x="2112396" y="3566721"/>
             <a:ext cx="968557" cy="725462"/>
           </a:xfrm>
           <a:prstGeom prst="rect">
@@ -3970,7 +3364,7 @@
         </p:nvSpPr>
         <p:spPr>
           <a:xfrm>
-            <a:off x="3480992" y="3100982"/>
+            <a:off x="3492236" y="3587123"/>
             <a:ext cx="1021440" cy="648499"/>
           </a:xfrm>
           <a:prstGeom prst="rect">
@@ -4012,7 +3406,27 @@
                 <a:latin typeface="Arial" panose="020B0604020202020204" pitchFamily="34" charset="0"/>
                 <a:cs typeface="Arial" panose="020B0604020202020204" pitchFamily="34" charset="0"/>
               </a:rPr>
-              <a:t>La medida del contorno o borde de una figura</a:t>
+              <a:t>a la </a:t>
+            </a:r>
+            <a:r>
+              <a:rPr lang="es-ES" sz="900" dirty="0" smtClean="0">
+                <a:solidFill>
+                  <a:schemeClr val="tx1"/>
+                </a:solidFill>
+                <a:latin typeface="Arial" panose="020B0604020202020204" pitchFamily="34" charset="0"/>
+                <a:cs typeface="Arial" panose="020B0604020202020204" pitchFamily="34" charset="0"/>
+              </a:rPr>
+              <a:t>medida del contorno o borde de una </a:t>
+            </a:r>
+            <a:r>
+              <a:rPr lang="es-ES" sz="900" dirty="0" smtClean="0">
+                <a:solidFill>
+                  <a:schemeClr val="tx1"/>
+                </a:solidFill>
+                <a:latin typeface="Arial" panose="020B0604020202020204" pitchFamily="34" charset="0"/>
+                <a:cs typeface="Arial" panose="020B0604020202020204" pitchFamily="34" charset="0"/>
+              </a:rPr>
+              <a:t>figura plana</a:t>
             </a:r>
             <a:endParaRPr lang="es-ES" sz="900" dirty="0">
               <a:solidFill>
@@ -4032,8 +3446,8 @@
         </p:nvSpPr>
         <p:spPr>
           <a:xfrm>
-            <a:off x="7666652" y="3102000"/>
-            <a:ext cx="1154258" cy="972941"/>
+            <a:off x="7690714" y="3571231"/>
+            <a:ext cx="1201969" cy="1000443"/>
           </a:xfrm>
           <a:prstGeom prst="rect">
             <a:avLst/>
@@ -4077,8 +3491,15 @@
                 <a:latin typeface="Arial" panose="020B0604020202020204" pitchFamily="34" charset="0"/>
                 <a:cs typeface="Arial" panose="020B0604020202020204" pitchFamily="34" charset="0"/>
               </a:rPr>
-              <a:t>Cuadriláteros</a:t>
-            </a:r>
+              <a:t>los cuadriláteros</a:t>
+            </a:r>
+            <a:endParaRPr lang="es-ES" sz="900" dirty="0" smtClean="0">
+              <a:solidFill>
+                <a:schemeClr val="tx1"/>
+              </a:solidFill>
+              <a:latin typeface="Arial" panose="020B0604020202020204" pitchFamily="34" charset="0"/>
+              <a:cs typeface="Arial" panose="020B0604020202020204" pitchFamily="34" charset="0"/>
+            </a:endParaRPr>
           </a:p>
           <a:p>
             <a:pPr marL="171450" indent="-171450">
@@ -4093,8 +3514,15 @@
                 <a:latin typeface="Arial" panose="020B0604020202020204" pitchFamily="34" charset="0"/>
                 <a:cs typeface="Arial" panose="020B0604020202020204" pitchFamily="34" charset="0"/>
               </a:rPr>
-              <a:t>Triángulos</a:t>
-            </a:r>
+              <a:t>los triángulos</a:t>
+            </a:r>
+            <a:endParaRPr lang="es-ES" sz="900" dirty="0" smtClean="0">
+              <a:solidFill>
+                <a:schemeClr val="tx1"/>
+              </a:solidFill>
+              <a:latin typeface="Arial" panose="020B0604020202020204" pitchFamily="34" charset="0"/>
+              <a:cs typeface="Arial" panose="020B0604020202020204" pitchFamily="34" charset="0"/>
+            </a:endParaRPr>
           </a:p>
           <a:p>
             <a:pPr marL="171450" indent="-171450">
@@ -4109,8 +3537,15 @@
                 <a:latin typeface="Arial" panose="020B0604020202020204" pitchFamily="34" charset="0"/>
                 <a:cs typeface="Arial" panose="020B0604020202020204" pitchFamily="34" charset="0"/>
               </a:rPr>
-              <a:t>Polígonos</a:t>
-            </a:r>
+              <a:t>los polígonos</a:t>
+            </a:r>
+            <a:endParaRPr lang="es-ES" sz="900" dirty="0" smtClean="0">
+              <a:solidFill>
+                <a:schemeClr val="tx1"/>
+              </a:solidFill>
+              <a:latin typeface="Arial" panose="020B0604020202020204" pitchFamily="34" charset="0"/>
+              <a:cs typeface="Arial" panose="020B0604020202020204" pitchFamily="34" charset="0"/>
+            </a:endParaRPr>
           </a:p>
           <a:p>
             <a:pPr marL="171450" indent="-171450">
@@ -4125,8 +3560,15 @@
                 <a:latin typeface="Arial" panose="020B0604020202020204" pitchFamily="34" charset="0"/>
                 <a:cs typeface="Arial" panose="020B0604020202020204" pitchFamily="34" charset="0"/>
               </a:rPr>
-              <a:t>Círculos</a:t>
-            </a:r>
+              <a:t>los círculos</a:t>
+            </a:r>
+            <a:endParaRPr lang="es-ES" sz="900" dirty="0" smtClean="0">
+              <a:solidFill>
+                <a:schemeClr val="tx1"/>
+              </a:solidFill>
+              <a:latin typeface="Arial" panose="020B0604020202020204" pitchFamily="34" charset="0"/>
+              <a:cs typeface="Arial" panose="020B0604020202020204" pitchFamily="34" charset="0"/>
+            </a:endParaRPr>
           </a:p>
           <a:p>
             <a:pPr marL="171450" indent="-171450">
@@ -4141,7 +3583,7 @@
                 <a:latin typeface="Arial" panose="020B0604020202020204" pitchFamily="34" charset="0"/>
                 <a:cs typeface="Arial" panose="020B0604020202020204" pitchFamily="34" charset="0"/>
               </a:rPr>
-              <a:t>Figuras circulares</a:t>
+              <a:t>las regiones circulares</a:t>
             </a:r>
             <a:endParaRPr lang="es-ES" sz="900" dirty="0">
               <a:solidFill>
@@ -4161,7 +3603,7 @@
         </p:nvSpPr>
         <p:spPr>
           <a:xfrm>
-            <a:off x="2028444" y="2854431"/>
+            <a:off x="2052507" y="3323662"/>
             <a:ext cx="1117174" cy="230832"/>
           </a:xfrm>
           <a:prstGeom prst="rect">
@@ -4198,7 +3640,7 @@
         </p:nvSpPr>
         <p:spPr>
           <a:xfrm>
-            <a:off x="3435754" y="2854431"/>
+            <a:off x="3437538" y="3302312"/>
             <a:ext cx="1117174" cy="230832"/>
           </a:xfrm>
           <a:prstGeom prst="rect">
@@ -4218,7 +3660,14 @@
                 <a:latin typeface="Arial" panose="020B0604020202020204" pitchFamily="34" charset="0"/>
                 <a:cs typeface="Arial" panose="020B0604020202020204" pitchFamily="34" charset="0"/>
               </a:rPr>
-              <a:t>que son</a:t>
+              <a:t>que </a:t>
+            </a:r>
+            <a:r>
+              <a:rPr lang="es-ES" sz="900" dirty="0" smtClean="0">
+                <a:latin typeface="Arial" panose="020B0604020202020204" pitchFamily="34" charset="0"/>
+                <a:cs typeface="Arial" panose="020B0604020202020204" pitchFamily="34" charset="0"/>
+              </a:rPr>
+              <a:t>equivale</a:t>
             </a:r>
             <a:endParaRPr lang="es-ES" sz="900" dirty="0">
               <a:latin typeface="Arial" panose="020B0604020202020204" pitchFamily="34" charset="0"/>
@@ -4235,7 +3684,7 @@
         </p:nvSpPr>
         <p:spPr>
           <a:xfrm>
-            <a:off x="4850088" y="2878938"/>
+            <a:off x="4931123" y="3454538"/>
             <a:ext cx="1117174" cy="230832"/>
           </a:xfrm>
           <a:prstGeom prst="rect">
@@ -4255,7 +3704,7 @@
                 <a:latin typeface="Arial" panose="020B0604020202020204" pitchFamily="34" charset="0"/>
                 <a:cs typeface="Arial" panose="020B0604020202020204" pitchFamily="34" charset="0"/>
               </a:rPr>
-              <a:t>que son </a:t>
+              <a:t>como</a:t>
             </a:r>
             <a:endParaRPr lang="es-ES" sz="900" dirty="0">
               <a:latin typeface="Arial" panose="020B0604020202020204" pitchFamily="34" charset="0"/>
@@ -4272,7 +3721,7 @@
         </p:nvSpPr>
         <p:spPr>
           <a:xfrm>
-            <a:off x="6295303" y="2877877"/>
+            <a:off x="6319366" y="3347108"/>
             <a:ext cx="1117174" cy="230832"/>
           </a:xfrm>
           <a:prstGeom prst="rect">
@@ -4292,7 +3741,7 @@
                 <a:latin typeface="Arial" panose="020B0604020202020204" pitchFamily="34" charset="0"/>
                 <a:cs typeface="Arial" panose="020B0604020202020204" pitchFamily="34" charset="0"/>
               </a:rPr>
-              <a:t>que son</a:t>
+              <a:t>como</a:t>
             </a:r>
             <a:endParaRPr lang="es-ES" sz="900" dirty="0">
               <a:latin typeface="Arial" panose="020B0604020202020204" pitchFamily="34" charset="0"/>
@@ -4309,7 +3758,7 @@
         </p:nvSpPr>
         <p:spPr>
           <a:xfrm>
-            <a:off x="7666652" y="2810333"/>
+            <a:off x="7690715" y="3279564"/>
             <a:ext cx="1117174" cy="230832"/>
           </a:xfrm>
           <a:prstGeom prst="rect">
@@ -4353,7 +3802,7 @@
         </p:nvCxnSpPr>
         <p:spPr>
           <a:xfrm rot="16200000" flipH="1">
-            <a:off x="1062409" y="2829263"/>
+            <a:off x="1079445" y="3347578"/>
             <a:ext cx="72000" cy="0"/>
           </a:xfrm>
           <a:prstGeom prst="bentConnector3">
@@ -4390,12 +3839,12 @@
         </p:nvCxnSpPr>
         <p:spPr>
           <a:xfrm rot="16200000" flipH="1">
-            <a:off x="1062410" y="3075447"/>
+            <a:off x="1087404" y="3563259"/>
             <a:ext cx="72000" cy="0"/>
           </a:xfrm>
           <a:prstGeom prst="bentConnector3">
             <a:avLst>
-              <a:gd name="adj1" fmla="val 50000"/>
+              <a:gd name="adj1" fmla="val 241822"/>
             </a:avLst>
           </a:prstGeom>
           <a:ln w="12700">
@@ -4427,7 +3876,7 @@
         </p:nvCxnSpPr>
         <p:spPr>
           <a:xfrm rot="16200000" flipH="1">
-            <a:off x="2542250" y="2830094"/>
+            <a:off x="2566313" y="3299325"/>
             <a:ext cx="72000" cy="0"/>
           </a:xfrm>
           <a:prstGeom prst="bentConnector3">
@@ -4464,7 +3913,7 @@
         </p:nvCxnSpPr>
         <p:spPr>
           <a:xfrm rot="16200000" flipH="1">
-            <a:off x="2540289" y="3057591"/>
+            <a:off x="2564352" y="3526822"/>
             <a:ext cx="72000" cy="876"/>
           </a:xfrm>
           <a:prstGeom prst="bentConnector3">
@@ -4501,7 +3950,7 @@
         </p:nvCxnSpPr>
         <p:spPr>
           <a:xfrm rot="16200000" flipH="1">
-            <a:off x="3938628" y="2836653"/>
+            <a:off x="3962691" y="3305884"/>
             <a:ext cx="72000" cy="876"/>
           </a:xfrm>
           <a:prstGeom prst="bentConnector3">
@@ -4538,7 +3987,7 @@
         </p:nvCxnSpPr>
         <p:spPr>
           <a:xfrm rot="16200000" flipH="1">
-            <a:off x="3934652" y="3069439"/>
+            <a:off x="3957407" y="3550266"/>
             <a:ext cx="72000" cy="876"/>
           </a:xfrm>
           <a:prstGeom prst="bentConnector3">
@@ -4575,7 +4024,7 @@
         </p:nvCxnSpPr>
         <p:spPr>
           <a:xfrm rot="16200000" flipH="1">
-            <a:off x="5409249" y="2871060"/>
+            <a:off x="5447263" y="3405884"/>
             <a:ext cx="72000" cy="876"/>
           </a:xfrm>
           <a:prstGeom prst="bentConnector3">
@@ -4612,7 +4061,7 @@
         </p:nvCxnSpPr>
         <p:spPr>
           <a:xfrm rot="16200000" flipH="1">
-            <a:off x="5406588" y="3106771"/>
+            <a:off x="5441731" y="3684932"/>
             <a:ext cx="72000" cy="876"/>
           </a:xfrm>
           <a:prstGeom prst="bentConnector3">
@@ -4649,7 +4098,7 @@
         </p:nvCxnSpPr>
         <p:spPr>
           <a:xfrm rot="16200000" flipH="1">
-            <a:off x="6834155" y="2870773"/>
+            <a:off x="6858218" y="3340004"/>
             <a:ext cx="72000" cy="876"/>
           </a:xfrm>
           <a:prstGeom prst="bentConnector3">
@@ -4686,7 +4135,7 @@
         </p:nvCxnSpPr>
         <p:spPr>
           <a:xfrm rot="16200000" flipH="1">
-            <a:off x="6834212" y="3081036"/>
+            <a:off x="6858275" y="3550267"/>
             <a:ext cx="72000" cy="876"/>
           </a:xfrm>
           <a:prstGeom prst="bentConnector3">
@@ -4723,7 +4172,7 @@
         </p:nvCxnSpPr>
         <p:spPr>
           <a:xfrm rot="16200000" flipH="1">
-            <a:off x="8183954" y="2787311"/>
+            <a:off x="8208017" y="3256542"/>
             <a:ext cx="72000" cy="876"/>
           </a:xfrm>
           <a:prstGeom prst="bentConnector3">
@@ -4760,7 +4209,7 @@
         </p:nvCxnSpPr>
         <p:spPr>
           <a:xfrm rot="16200000" flipH="1">
-            <a:off x="8183078" y="3068607"/>
+            <a:off x="8207141" y="3537838"/>
             <a:ext cx="72000" cy="876"/>
           </a:xfrm>
           <a:prstGeom prst="bentConnector3">
@@ -4793,1007 +4242,6 @@
     <p:extLst>
       <p:ext uri="{BB962C8B-B14F-4D97-AF65-F5344CB8AC3E}">
         <p14:creationId xmlns:p14="http://schemas.microsoft.com/office/powerpoint/2010/main" val="1910700679"/>
-      </p:ext>
-    </p:extLst>
-  </p:cSld>
-  <p:clrMapOvr>
-    <a:masterClrMapping/>
-  </p:clrMapOvr>
-  <p:timing>
-    <p:tnLst>
-      <p:par>
-        <p:cTn id="1" dur="indefinite" restart="never" nodeType="tmRoot"/>
-      </p:par>
-    </p:tnLst>
-  </p:timing>
-</p:sld>
-</file>
-
-<file path=ppt/slides/slide2.xml><?xml version="1.0" encoding="utf-8"?>
-<p:sld xmlns:a="http://schemas.openxmlformats.org/drawingml/2006/main" xmlns:r="http://schemas.openxmlformats.org/officeDocument/2006/relationships" xmlns:p="http://schemas.openxmlformats.org/presentationml/2006/main">
-  <p:cSld>
-    <p:spTree>
-      <p:nvGrpSpPr>
-        <p:cNvPr id="1" name=""/>
-        <p:cNvGrpSpPr/>
-        <p:nvPr/>
-      </p:nvGrpSpPr>
-      <p:grpSpPr>
-        <a:xfrm>
-          <a:off x="0" y="0"/>
-          <a:ext cx="0" cy="0"/>
-          <a:chOff x="0" y="0"/>
-          <a:chExt cx="0" cy="0"/>
-        </a:xfrm>
-      </p:grpSpPr>
-      <p:sp>
-        <p:nvSpPr>
-          <p:cNvPr id="2" name="CuadroTexto 1"/>
-          <p:cNvSpPr txBox="1"/>
-          <p:nvPr/>
-        </p:nvSpPr>
-        <p:spPr>
-          <a:xfrm>
-            <a:off x="592334" y="213386"/>
-            <a:ext cx="8302751" cy="3385542"/>
-          </a:xfrm>
-          <a:prstGeom prst="rect">
-            <a:avLst/>
-          </a:prstGeom>
-          <a:noFill/>
-        </p:spPr>
-        <p:txBody>
-          <a:bodyPr wrap="square" rtlCol="0">
-            <a:spAutoFit/>
-          </a:bodyPr>
-          <a:lstStyle/>
-          <a:p>
-            <a:r>
-              <a:rPr lang="es-ES" sz="1600" b="1" dirty="0" smtClean="0"/>
-              <a:t>Recomendaciones</a:t>
-            </a:r>
-          </a:p>
-          <a:p>
-            <a:endParaRPr lang="es-ES" sz="1600" b="1" dirty="0" smtClean="0"/>
-          </a:p>
-          <a:p>
-            <a:pPr marL="285750" indent="-285750">
-              <a:buFont typeface="Arial" panose="020B0604020202020204" pitchFamily="34" charset="0"/>
-              <a:buChar char="•"/>
-            </a:pPr>
-            <a:r>
-              <a:rPr lang="es-ES" sz="1300" dirty="0" smtClean="0"/>
-              <a:t>Para usar esta plantilla, NO OLVIDE eliminar esta diapositiva de recomendaciones luego de leerla.</a:t>
-            </a:r>
-          </a:p>
-          <a:p>
-            <a:pPr marL="285750" indent="-285750">
-              <a:buFont typeface="Arial" panose="020B0604020202020204" pitchFamily="34" charset="0"/>
-              <a:buChar char="•"/>
-            </a:pPr>
-            <a:r>
-              <a:rPr lang="es-ES" sz="1300" dirty="0" smtClean="0"/>
-              <a:t>El mapa conceptual debe estar en </a:t>
-            </a:r>
-            <a:r>
-              <a:rPr lang="es-ES" sz="1300" b="1" dirty="0" smtClean="0"/>
-              <a:t>una sola </a:t>
-            </a:r>
-            <a:r>
-              <a:rPr lang="es-ES" sz="1300" dirty="0" smtClean="0"/>
-              <a:t>diapositiva.</a:t>
-            </a:r>
-          </a:p>
-          <a:p>
-            <a:pPr marL="285750" indent="-285750">
-              <a:buFont typeface="Arial" panose="020B0604020202020204" pitchFamily="34" charset="0"/>
-              <a:buChar char="•"/>
-            </a:pPr>
-            <a:r>
-              <a:rPr lang="es-ES" sz="1300" dirty="0" smtClean="0"/>
-              <a:t>Solo se permiten hasta nodos de </a:t>
-            </a:r>
-            <a:r>
-              <a:rPr lang="es-ES" sz="1300" b="1" dirty="0" smtClean="0"/>
-              <a:t>séptimo </a:t>
-            </a:r>
-            <a:r>
-              <a:rPr lang="es-ES" sz="1300" dirty="0" smtClean="0"/>
-              <a:t>nivel.</a:t>
-            </a:r>
-          </a:p>
-          <a:p>
-            <a:pPr marL="285750" indent="-285750">
-              <a:buFont typeface="Arial" panose="020B0604020202020204" pitchFamily="34" charset="0"/>
-              <a:buChar char="•"/>
-            </a:pPr>
-            <a:r>
-              <a:rPr lang="es-ES" sz="1300" dirty="0" smtClean="0"/>
-              <a:t>No se pueden insertar fórmulas matemáticas; si necesita una fórmula, debe </a:t>
-            </a:r>
-            <a:r>
-              <a:rPr lang="es-ES" sz="1300" b="1" dirty="0" smtClean="0"/>
-              <a:t>convertirla a imagen </a:t>
-            </a:r>
-            <a:r>
-              <a:rPr lang="es-ES" sz="1300" dirty="0" smtClean="0"/>
-              <a:t>para ser insertada.</a:t>
-            </a:r>
-          </a:p>
-          <a:p>
-            <a:pPr marL="285750" indent="-285750">
-              <a:buFont typeface="Arial" panose="020B0604020202020204" pitchFamily="34" charset="0"/>
-              <a:buChar char="•"/>
-            </a:pPr>
-            <a:r>
-              <a:rPr lang="es-ES" sz="1300" dirty="0" smtClean="0"/>
-              <a:t>Luego de aprobado, exporte el mapa conceptual como PDF usando la nomenclatura determinada en la escaleta del guion.</a:t>
-            </a:r>
-          </a:p>
-          <a:p>
-            <a:pPr marL="285750" indent="-285750">
-              <a:buFont typeface="Arial" panose="020B0604020202020204" pitchFamily="34" charset="0"/>
-              <a:buChar char="•"/>
-            </a:pPr>
-            <a:r>
-              <a:rPr lang="es-ES" sz="1300" dirty="0" smtClean="0"/>
-              <a:t>Evite frases largas en los nodos o conectores; el nombre ideal de un nodo o conector tiene un </a:t>
-            </a:r>
-            <a:r>
-              <a:rPr lang="es-ES" sz="1300" b="1" dirty="0" smtClean="0"/>
-              <a:t>máximo de cuatro palabras</a:t>
-            </a:r>
-            <a:r>
-              <a:rPr lang="es-ES" sz="1300" dirty="0" smtClean="0"/>
-              <a:t>. Y si el nodo es una lista (normalmente los nodos de último nivel en el mapa), no incluya más de </a:t>
-            </a:r>
-            <a:r>
-              <a:rPr lang="es-ES" sz="1300" b="1" dirty="0" smtClean="0"/>
-              <a:t>ocho términos</a:t>
-            </a:r>
-            <a:r>
-              <a:rPr lang="es-ES" sz="1300" dirty="0" smtClean="0"/>
-              <a:t>. Lea detenidamente la </a:t>
-            </a:r>
-            <a:r>
-              <a:rPr lang="es-ES" sz="1300" dirty="0">
-                <a:hlinkClick r:id="rId2"/>
-              </a:rPr>
-              <a:t>guía de estilo de </a:t>
-            </a:r>
-            <a:r>
-              <a:rPr lang="es-ES" sz="1300" dirty="0" smtClean="0">
-                <a:hlinkClick r:id="rId2"/>
-              </a:rPr>
-              <a:t>mapas </a:t>
-            </a:r>
-            <a:r>
-              <a:rPr lang="es-ES" sz="1300" dirty="0">
-                <a:hlinkClick r:id="rId2"/>
-              </a:rPr>
-              <a:t>conceptuales</a:t>
-            </a:r>
-            <a:r>
-              <a:rPr lang="es-ES" sz="1300" dirty="0" smtClean="0"/>
-              <a:t>.</a:t>
-            </a:r>
-          </a:p>
-          <a:p>
-            <a:pPr marL="285750" indent="-285750">
-              <a:buFont typeface="Arial" panose="020B0604020202020204" pitchFamily="34" charset="0"/>
-              <a:buChar char="•"/>
-            </a:pPr>
-            <a:r>
-              <a:rPr lang="es-ES" sz="1300" dirty="0" smtClean="0"/>
-              <a:t>Asegúrese de haber </a:t>
-            </a:r>
-            <a:r>
-              <a:rPr lang="es-ES" sz="1300" b="1" dirty="0" smtClean="0"/>
-              <a:t>leído y comprendido completamente </a:t>
-            </a:r>
-            <a:r>
-              <a:rPr lang="es-ES" sz="1300" dirty="0" smtClean="0"/>
-              <a:t>la </a:t>
-            </a:r>
-            <a:r>
-              <a:rPr lang="es-ES" sz="1300" dirty="0" smtClean="0">
-                <a:hlinkClick r:id="rId2"/>
-              </a:rPr>
-              <a:t>guía de estilo de mapas conceptuales</a:t>
-            </a:r>
-            <a:r>
-              <a:rPr lang="es-ES" sz="1300" dirty="0" smtClean="0"/>
-              <a:t>.</a:t>
-            </a:r>
-          </a:p>
-          <a:p>
-            <a:pPr marL="285750" indent="-285750">
-              <a:buFont typeface="Arial" panose="020B0604020202020204" pitchFamily="34" charset="0"/>
-              <a:buChar char="•"/>
-            </a:pPr>
-            <a:r>
-              <a:rPr lang="es-ES" sz="1300" dirty="0" smtClean="0"/>
-              <a:t>Revise y aplique </a:t>
-            </a:r>
-            <a:r>
-              <a:rPr lang="es-ES" sz="1300" dirty="0" smtClean="0">
-                <a:hlinkClick r:id="rId3"/>
-              </a:rPr>
-              <a:t>este ejemplo </a:t>
-            </a:r>
-            <a:r>
-              <a:rPr lang="es-ES" sz="1300" dirty="0" smtClean="0"/>
-              <a:t>y </a:t>
-            </a:r>
-            <a:r>
-              <a:rPr lang="es-ES" sz="1300" dirty="0" smtClean="0">
-                <a:hlinkClick r:id="rId4"/>
-              </a:rPr>
-              <a:t>este otro ejemplo </a:t>
-            </a:r>
-            <a:r>
-              <a:rPr lang="es-ES" sz="1300" dirty="0" smtClean="0"/>
-              <a:t>de mapas conceptuales.</a:t>
-            </a:r>
-          </a:p>
-          <a:p>
-            <a:pPr marL="285750" indent="-285750">
-              <a:buFont typeface="Arial" panose="020B0604020202020204" pitchFamily="34" charset="0"/>
-              <a:buChar char="•"/>
-            </a:pPr>
-            <a:r>
-              <a:rPr lang="es-ES" sz="1300" b="1" dirty="0" smtClean="0"/>
-              <a:t>NUNCA</a:t>
-            </a:r>
-            <a:r>
-              <a:rPr lang="es-ES" sz="1300" dirty="0" smtClean="0"/>
-              <a:t> inserte nuevas formas o cajas de texto. Duplique los existentes (copiando y pegando).</a:t>
-            </a:r>
-          </a:p>
-          <a:p>
-            <a:pPr marL="285750" indent="-285750">
-              <a:buFont typeface="Arial" panose="020B0604020202020204" pitchFamily="34" charset="0"/>
-              <a:buChar char="•"/>
-            </a:pPr>
-            <a:r>
-              <a:rPr lang="es-ES" sz="1300" dirty="0" smtClean="0"/>
-              <a:t>Los nodos (o conectores) no se pueden unir en un nivel inferior; </a:t>
-            </a:r>
-            <a:r>
-              <a:rPr lang="es-ES" sz="1300" smtClean="0"/>
-              <a:t>el mapa conceptual </a:t>
-            </a:r>
-            <a:r>
-              <a:rPr lang="es-ES" sz="1300" dirty="0" smtClean="0"/>
-              <a:t>es como un árbol, las ramas no se vuelven a unir después </a:t>
-            </a:r>
-            <a:r>
-              <a:rPr lang="es-ES" sz="1300" smtClean="0"/>
-              <a:t>de separadas.</a:t>
-            </a:r>
-            <a:endParaRPr lang="es-ES" sz="1300" dirty="0"/>
-          </a:p>
-        </p:txBody>
-      </p:sp>
-      <p:grpSp>
-        <p:nvGrpSpPr>
-          <p:cNvPr id="73" name="Grupo 72"/>
-          <p:cNvGrpSpPr/>
-          <p:nvPr/>
-        </p:nvGrpSpPr>
-        <p:grpSpPr>
-          <a:xfrm>
-            <a:off x="3478819" y="3995993"/>
-            <a:ext cx="2164335" cy="2652658"/>
-            <a:chOff x="3478819" y="3995993"/>
-            <a:chExt cx="2164335" cy="2652658"/>
-          </a:xfrm>
-        </p:grpSpPr>
-        <p:grpSp>
-          <p:nvGrpSpPr>
-            <p:cNvPr id="70" name="Grupo 69"/>
-            <p:cNvGrpSpPr/>
-            <p:nvPr/>
-          </p:nvGrpSpPr>
-          <p:grpSpPr>
-            <a:xfrm>
-              <a:off x="3478819" y="3995993"/>
-              <a:ext cx="2164335" cy="2254149"/>
-              <a:chOff x="3154860" y="4048244"/>
-              <a:chExt cx="2164335" cy="2254149"/>
-            </a:xfrm>
-          </p:grpSpPr>
-          <p:sp>
-            <p:nvSpPr>
-              <p:cNvPr id="12" name="Rectángulo 11"/>
-              <p:cNvSpPr/>
-              <p:nvPr/>
-            </p:nvSpPr>
-            <p:spPr>
-              <a:xfrm>
-                <a:off x="3154861" y="4048434"/>
-                <a:ext cx="931786" cy="407985"/>
-              </a:xfrm>
-              <a:prstGeom prst="rect">
-                <a:avLst/>
-              </a:prstGeom>
-              <a:solidFill>
-                <a:schemeClr val="bg2">
-                  <a:lumMod val="50000"/>
-                </a:schemeClr>
-              </a:solidFill>
-              <a:ln>
-                <a:solidFill>
-                  <a:schemeClr val="tx1"/>
-                </a:solidFill>
-              </a:ln>
-            </p:spPr>
-            <p:style>
-              <a:lnRef idx="2">
-                <a:schemeClr val="accent6"/>
-              </a:lnRef>
-              <a:fillRef idx="1">
-                <a:schemeClr val="lt1"/>
-              </a:fillRef>
-              <a:effectRef idx="0">
-                <a:schemeClr val="accent6"/>
-              </a:effectRef>
-              <a:fontRef idx="minor">
-                <a:schemeClr val="dk1"/>
-              </a:fontRef>
-            </p:style>
-            <p:txBody>
-              <a:bodyPr rtlCol="0" anchor="ctr"/>
-              <a:lstStyle/>
-              <a:p>
-                <a:pPr algn="ctr"/>
-                <a:r>
-                  <a:rPr lang="es-ES" sz="1000" dirty="0" smtClean="0">
-                    <a:solidFill>
-                      <a:schemeClr val="bg1"/>
-                    </a:solidFill>
-                  </a:rPr>
-                  <a:t>nodo de segundo nivel</a:t>
-                </a:r>
-                <a:endParaRPr lang="es-ES" sz="1000" dirty="0">
-                  <a:solidFill>
-                    <a:schemeClr val="bg1"/>
-                  </a:solidFill>
-                </a:endParaRPr>
-              </a:p>
-            </p:txBody>
-          </p:sp>
-          <p:sp>
-            <p:nvSpPr>
-              <p:cNvPr id="13" name="Rectángulo 12"/>
-              <p:cNvSpPr/>
-              <p:nvPr/>
-            </p:nvSpPr>
-            <p:spPr>
-              <a:xfrm>
-                <a:off x="4419751" y="4048245"/>
-                <a:ext cx="899443" cy="408361"/>
-              </a:xfrm>
-              <a:prstGeom prst="rect">
-                <a:avLst/>
-              </a:prstGeom>
-              <a:solidFill>
-                <a:schemeClr val="bg2">
-                  <a:lumMod val="50000"/>
-                </a:schemeClr>
-              </a:solidFill>
-              <a:ln>
-                <a:solidFill>
-                  <a:schemeClr val="tx1"/>
-                </a:solidFill>
-              </a:ln>
-            </p:spPr>
-            <p:style>
-              <a:lnRef idx="2">
-                <a:schemeClr val="accent6"/>
-              </a:lnRef>
-              <a:fillRef idx="1">
-                <a:schemeClr val="lt1"/>
-              </a:fillRef>
-              <a:effectRef idx="0">
-                <a:schemeClr val="accent6"/>
-              </a:effectRef>
-              <a:fontRef idx="minor">
-                <a:schemeClr val="dk1"/>
-              </a:fontRef>
-            </p:style>
-            <p:txBody>
-              <a:bodyPr rtlCol="0" anchor="ctr"/>
-              <a:lstStyle/>
-              <a:p>
-                <a:pPr algn="ctr"/>
-                <a:r>
-                  <a:rPr lang="es-ES" sz="1000" dirty="0" smtClean="0">
-                    <a:solidFill>
-                      <a:schemeClr val="bg1"/>
-                    </a:solidFill>
-                  </a:rPr>
-                  <a:t>nodo de segundo nivel</a:t>
-                </a:r>
-                <a:endParaRPr lang="es-ES" sz="1000" dirty="0">
-                  <a:solidFill>
-                    <a:schemeClr val="bg1"/>
-                  </a:solidFill>
-                </a:endParaRPr>
-              </a:p>
-            </p:txBody>
-          </p:sp>
-          <p:cxnSp>
-            <p:nvCxnSpPr>
-              <p:cNvPr id="14" name="Conector angular 13"/>
-              <p:cNvCxnSpPr>
-                <a:stCxn id="13" idx="0"/>
-                <a:endCxn id="12" idx="0"/>
-              </p:cNvCxnSpPr>
-              <p:nvPr/>
-            </p:nvCxnSpPr>
-            <p:spPr>
-              <a:xfrm rot="16200000" flipH="1" flipV="1">
-                <a:off x="4245019" y="3423979"/>
-                <a:ext cx="189" cy="1248719"/>
-              </a:xfrm>
-              <a:prstGeom prst="bentConnector3">
-                <a:avLst>
-                  <a:gd name="adj1" fmla="val -120952381"/>
-                </a:avLst>
-              </a:prstGeom>
-              <a:ln w="12700">
-                <a:solidFill>
-                  <a:schemeClr val="tx1"/>
-                </a:solidFill>
-              </a:ln>
-            </p:spPr>
-            <p:style>
-              <a:lnRef idx="1">
-                <a:schemeClr val="accent1"/>
-              </a:lnRef>
-              <a:fillRef idx="0">
-                <a:schemeClr val="accent1"/>
-              </a:fillRef>
-              <a:effectRef idx="0">
-                <a:schemeClr val="accent1"/>
-              </a:effectRef>
-              <a:fontRef idx="minor">
-                <a:schemeClr val="tx1"/>
-              </a:fontRef>
-            </p:style>
-          </p:cxnSp>
-          <p:sp>
-            <p:nvSpPr>
-              <p:cNvPr id="16" name="CuadroTexto 15"/>
-              <p:cNvSpPr txBox="1"/>
-              <p:nvPr/>
-            </p:nvSpPr>
-            <p:spPr>
-              <a:xfrm>
-                <a:off x="3154860" y="4659841"/>
-                <a:ext cx="931785" cy="246599"/>
-              </a:xfrm>
-              <a:prstGeom prst="rect">
-                <a:avLst/>
-              </a:prstGeom>
-              <a:noFill/>
-            </p:spPr>
-            <p:txBody>
-              <a:bodyPr wrap="square" rtlCol="0">
-                <a:spAutoFit/>
-              </a:bodyPr>
-              <a:lstStyle/>
-              <a:p>
-                <a:pPr algn="ctr"/>
-                <a:r>
-                  <a:rPr lang="es-ES" sz="1000" dirty="0" smtClean="0"/>
-                  <a:t>conector</a:t>
-                </a:r>
-                <a:endParaRPr lang="es-ES" sz="1000" dirty="0"/>
-              </a:p>
-            </p:txBody>
-          </p:sp>
-          <p:cxnSp>
-            <p:nvCxnSpPr>
-              <p:cNvPr id="17" name="Conector angular 16"/>
-              <p:cNvCxnSpPr>
-                <a:stCxn id="12" idx="2"/>
-                <a:endCxn id="16" idx="0"/>
-              </p:cNvCxnSpPr>
-              <p:nvPr/>
-            </p:nvCxnSpPr>
-            <p:spPr>
-              <a:xfrm rot="5400000">
-                <a:off x="3519043" y="4558130"/>
-                <a:ext cx="203422" cy="1"/>
-              </a:xfrm>
-              <a:prstGeom prst="bentConnector3">
-                <a:avLst/>
-              </a:prstGeom>
-              <a:ln w="12700">
-                <a:solidFill>
-                  <a:schemeClr val="tx1"/>
-                </a:solidFill>
-              </a:ln>
-            </p:spPr>
-            <p:style>
-              <a:lnRef idx="1">
-                <a:schemeClr val="accent1"/>
-              </a:lnRef>
-              <a:fillRef idx="0">
-                <a:schemeClr val="accent1"/>
-              </a:fillRef>
-              <a:effectRef idx="0">
-                <a:schemeClr val="accent1"/>
-              </a:effectRef>
-              <a:fontRef idx="minor">
-                <a:schemeClr val="tx1"/>
-              </a:fontRef>
-            </p:style>
-          </p:cxnSp>
-          <p:sp>
-            <p:nvSpPr>
-              <p:cNvPr id="18" name="Rectángulo 17"/>
-              <p:cNvSpPr/>
-              <p:nvPr/>
-            </p:nvSpPr>
-            <p:spPr>
-              <a:xfrm>
-                <a:off x="3217561" y="5112227"/>
-                <a:ext cx="806381" cy="395073"/>
-              </a:xfrm>
-              <a:prstGeom prst="rect">
-                <a:avLst/>
-              </a:prstGeom>
-              <a:solidFill>
-                <a:schemeClr val="bg2">
-                  <a:lumMod val="90000"/>
-                </a:schemeClr>
-              </a:solidFill>
-              <a:ln>
-                <a:solidFill>
-                  <a:schemeClr val="tx1"/>
-                </a:solidFill>
-              </a:ln>
-            </p:spPr>
-            <p:style>
-              <a:lnRef idx="2">
-                <a:schemeClr val="accent6"/>
-              </a:lnRef>
-              <a:fillRef idx="1">
-                <a:schemeClr val="lt1"/>
-              </a:fillRef>
-              <a:effectRef idx="0">
-                <a:schemeClr val="accent6"/>
-              </a:effectRef>
-              <a:fontRef idx="minor">
-                <a:schemeClr val="dk1"/>
-              </a:fontRef>
-            </p:style>
-            <p:txBody>
-              <a:bodyPr rtlCol="0" anchor="ctr"/>
-              <a:lstStyle/>
-              <a:p>
-                <a:pPr algn="ctr"/>
-                <a:r>
-                  <a:rPr lang="es-ES" sz="1000" dirty="0" smtClean="0">
-                    <a:solidFill>
-                      <a:schemeClr val="tx1"/>
-                    </a:solidFill>
-                  </a:rPr>
-                  <a:t>nodo de tercer nivel</a:t>
-                </a:r>
-                <a:endParaRPr lang="es-ES" sz="1000" dirty="0">
-                  <a:solidFill>
-                    <a:schemeClr val="tx1"/>
-                  </a:solidFill>
-                </a:endParaRPr>
-              </a:p>
-            </p:txBody>
-          </p:sp>
-          <p:cxnSp>
-            <p:nvCxnSpPr>
-              <p:cNvPr id="19" name="Conector angular 18"/>
-              <p:cNvCxnSpPr>
-                <a:stCxn id="16" idx="2"/>
-                <a:endCxn id="18" idx="0"/>
-              </p:cNvCxnSpPr>
-              <p:nvPr/>
-            </p:nvCxnSpPr>
-            <p:spPr>
-              <a:xfrm rot="5400000">
-                <a:off x="3517860" y="5009333"/>
-                <a:ext cx="205787" cy="1"/>
-              </a:xfrm>
-              <a:prstGeom prst="bentConnector3">
-                <a:avLst>
-                  <a:gd name="adj1" fmla="val 50000"/>
-                </a:avLst>
-              </a:prstGeom>
-              <a:ln w="12700">
-                <a:solidFill>
-                  <a:schemeClr val="tx1"/>
-                </a:solidFill>
-              </a:ln>
-            </p:spPr>
-            <p:style>
-              <a:lnRef idx="1">
-                <a:schemeClr val="accent1"/>
-              </a:lnRef>
-              <a:fillRef idx="0">
-                <a:schemeClr val="accent1"/>
-              </a:fillRef>
-              <a:effectRef idx="0">
-                <a:schemeClr val="accent1"/>
-              </a:effectRef>
-              <a:fontRef idx="minor">
-                <a:schemeClr val="tx1"/>
-              </a:fontRef>
-            </p:style>
-          </p:cxnSp>
-          <p:sp>
-            <p:nvSpPr>
-              <p:cNvPr id="21" name="CuadroTexto 20"/>
-              <p:cNvSpPr txBox="1"/>
-              <p:nvPr/>
-            </p:nvSpPr>
-            <p:spPr>
-              <a:xfrm>
-                <a:off x="4419752" y="4659841"/>
-                <a:ext cx="899443" cy="246221"/>
-              </a:xfrm>
-              <a:prstGeom prst="rect">
-                <a:avLst/>
-              </a:prstGeom>
-              <a:noFill/>
-            </p:spPr>
-            <p:txBody>
-              <a:bodyPr wrap="square" rtlCol="0">
-                <a:spAutoFit/>
-              </a:bodyPr>
-              <a:lstStyle/>
-              <a:p>
-                <a:pPr algn="ctr"/>
-                <a:r>
-                  <a:rPr lang="es-ES" sz="1000" dirty="0" smtClean="0"/>
-                  <a:t>conector</a:t>
-                </a:r>
-                <a:endParaRPr lang="es-ES" sz="1000" dirty="0"/>
-              </a:p>
-            </p:txBody>
-          </p:sp>
-          <p:cxnSp>
-            <p:nvCxnSpPr>
-              <p:cNvPr id="22" name="Conector angular 21"/>
-              <p:cNvCxnSpPr>
-                <a:stCxn id="13" idx="2"/>
-                <a:endCxn id="21" idx="0"/>
-              </p:cNvCxnSpPr>
-              <p:nvPr/>
-            </p:nvCxnSpPr>
-            <p:spPr>
-              <a:xfrm rot="16200000" flipH="1">
-                <a:off x="4767856" y="4558222"/>
-                <a:ext cx="203235" cy="1"/>
-              </a:xfrm>
-              <a:prstGeom prst="bentConnector3">
-                <a:avLst/>
-              </a:prstGeom>
-              <a:ln w="12700">
-                <a:solidFill>
-                  <a:schemeClr val="tx1"/>
-                </a:solidFill>
-              </a:ln>
-            </p:spPr>
-            <p:style>
-              <a:lnRef idx="1">
-                <a:schemeClr val="accent1"/>
-              </a:lnRef>
-              <a:fillRef idx="0">
-                <a:schemeClr val="accent1"/>
-              </a:fillRef>
-              <a:effectRef idx="0">
-                <a:schemeClr val="accent1"/>
-              </a:effectRef>
-              <a:fontRef idx="minor">
-                <a:schemeClr val="tx1"/>
-              </a:fontRef>
-            </p:style>
-          </p:cxnSp>
-          <p:sp>
-            <p:nvSpPr>
-              <p:cNvPr id="23" name="Rectángulo 22"/>
-              <p:cNvSpPr/>
-              <p:nvPr/>
-            </p:nvSpPr>
-            <p:spPr>
-              <a:xfrm>
-                <a:off x="4425637" y="5112226"/>
-                <a:ext cx="887669" cy="395074"/>
-              </a:xfrm>
-              <a:prstGeom prst="rect">
-                <a:avLst/>
-              </a:prstGeom>
-              <a:solidFill>
-                <a:schemeClr val="bg2">
-                  <a:lumMod val="90000"/>
-                </a:schemeClr>
-              </a:solidFill>
-              <a:ln>
-                <a:solidFill>
-                  <a:schemeClr val="tx1"/>
-                </a:solidFill>
-              </a:ln>
-            </p:spPr>
-            <p:style>
-              <a:lnRef idx="2">
-                <a:schemeClr val="accent6"/>
-              </a:lnRef>
-              <a:fillRef idx="1">
-                <a:schemeClr val="lt1"/>
-              </a:fillRef>
-              <a:effectRef idx="0">
-                <a:schemeClr val="accent6"/>
-              </a:effectRef>
-              <a:fontRef idx="minor">
-                <a:schemeClr val="dk1"/>
-              </a:fontRef>
-            </p:style>
-            <p:txBody>
-              <a:bodyPr rtlCol="0" anchor="ctr"/>
-              <a:lstStyle/>
-              <a:p>
-                <a:pPr algn="ctr"/>
-                <a:r>
-                  <a:rPr lang="es-ES" sz="1000" dirty="0" smtClean="0">
-                    <a:solidFill>
-                      <a:schemeClr val="tx1"/>
-                    </a:solidFill>
-                  </a:rPr>
-                  <a:t>nodo de tercer nivel</a:t>
-                </a:r>
-                <a:endParaRPr lang="es-ES" sz="1000" dirty="0">
-                  <a:solidFill>
-                    <a:schemeClr val="tx1"/>
-                  </a:solidFill>
-                </a:endParaRPr>
-              </a:p>
-            </p:txBody>
-          </p:sp>
-          <p:cxnSp>
-            <p:nvCxnSpPr>
-              <p:cNvPr id="24" name="Conector angular 23"/>
-              <p:cNvCxnSpPr>
-                <a:stCxn id="21" idx="2"/>
-                <a:endCxn id="23" idx="0"/>
-              </p:cNvCxnSpPr>
-              <p:nvPr/>
-            </p:nvCxnSpPr>
-            <p:spPr>
-              <a:xfrm rot="5400000">
-                <a:off x="4766391" y="5009143"/>
-                <a:ext cx="206164" cy="2"/>
-              </a:xfrm>
-              <a:prstGeom prst="bentConnector3">
-                <a:avLst>
-                  <a:gd name="adj1" fmla="val 50000"/>
-                </a:avLst>
-              </a:prstGeom>
-              <a:ln w="12700">
-                <a:solidFill>
-                  <a:schemeClr val="tx1"/>
-                </a:solidFill>
-              </a:ln>
-            </p:spPr>
-            <p:style>
-              <a:lnRef idx="1">
-                <a:schemeClr val="accent1"/>
-              </a:lnRef>
-              <a:fillRef idx="0">
-                <a:schemeClr val="accent1"/>
-              </a:fillRef>
-              <a:effectRef idx="0">
-                <a:schemeClr val="accent1"/>
-              </a:effectRef>
-              <a:fontRef idx="minor">
-                <a:schemeClr val="tx1"/>
-              </a:fontRef>
-            </p:style>
-          </p:cxnSp>
-          <p:sp>
-            <p:nvSpPr>
-              <p:cNvPr id="63" name="Rectángulo 62"/>
-              <p:cNvSpPr/>
-              <p:nvPr/>
-            </p:nvSpPr>
-            <p:spPr>
-              <a:xfrm>
-                <a:off x="3841922" y="5907320"/>
-                <a:ext cx="806381" cy="395073"/>
-              </a:xfrm>
-              <a:prstGeom prst="rect">
-                <a:avLst/>
-              </a:prstGeom>
-              <a:solidFill>
-                <a:schemeClr val="bg1"/>
-              </a:solidFill>
-              <a:ln>
-                <a:solidFill>
-                  <a:schemeClr val="tx1"/>
-                </a:solidFill>
-              </a:ln>
-            </p:spPr>
-            <p:style>
-              <a:lnRef idx="2">
-                <a:schemeClr val="accent6"/>
-              </a:lnRef>
-              <a:fillRef idx="1">
-                <a:schemeClr val="lt1"/>
-              </a:fillRef>
-              <a:effectRef idx="0">
-                <a:schemeClr val="accent6"/>
-              </a:effectRef>
-              <a:fontRef idx="minor">
-                <a:schemeClr val="dk1"/>
-              </a:fontRef>
-            </p:style>
-            <p:txBody>
-              <a:bodyPr rtlCol="0" anchor="ctr"/>
-              <a:lstStyle/>
-              <a:p>
-                <a:pPr algn="ctr"/>
-                <a:r>
-                  <a:rPr lang="es-ES" sz="1000" dirty="0" smtClean="0">
-                    <a:solidFill>
-                      <a:schemeClr val="tx1"/>
-                    </a:solidFill>
-                  </a:rPr>
-                  <a:t>nodo de cuarto nivel</a:t>
-                </a:r>
-                <a:endParaRPr lang="es-ES" sz="1000" dirty="0">
-                  <a:solidFill>
-                    <a:schemeClr val="tx1"/>
-                  </a:solidFill>
-                </a:endParaRPr>
-              </a:p>
-            </p:txBody>
-          </p:sp>
-          <p:cxnSp>
-            <p:nvCxnSpPr>
-              <p:cNvPr id="64" name="Conector angular 63"/>
-              <p:cNvCxnSpPr>
-                <a:stCxn id="18" idx="2"/>
-                <a:endCxn id="63" idx="0"/>
-              </p:cNvCxnSpPr>
-              <p:nvPr/>
-            </p:nvCxnSpPr>
-            <p:spPr>
-              <a:xfrm rot="16200000" flipH="1">
-                <a:off x="3732922" y="5395129"/>
-                <a:ext cx="400020" cy="624361"/>
-              </a:xfrm>
-              <a:prstGeom prst="bentConnector3">
-                <a:avLst>
-                  <a:gd name="adj1" fmla="val 50000"/>
-                </a:avLst>
-              </a:prstGeom>
-              <a:ln w="12700">
-                <a:solidFill>
-                  <a:schemeClr val="tx1"/>
-                </a:solidFill>
-              </a:ln>
-            </p:spPr>
-            <p:style>
-              <a:lnRef idx="1">
-                <a:schemeClr val="accent1"/>
-              </a:lnRef>
-              <a:fillRef idx="0">
-                <a:schemeClr val="accent1"/>
-              </a:fillRef>
-              <a:effectRef idx="0">
-                <a:schemeClr val="accent1"/>
-              </a:effectRef>
-              <a:fontRef idx="minor">
-                <a:schemeClr val="tx1"/>
-              </a:fontRef>
-            </p:style>
-          </p:cxnSp>
-          <p:cxnSp>
-            <p:nvCxnSpPr>
-              <p:cNvPr id="67" name="Conector angular 66"/>
-              <p:cNvCxnSpPr>
-                <a:stCxn id="23" idx="2"/>
-                <a:endCxn id="63" idx="0"/>
-              </p:cNvCxnSpPr>
-              <p:nvPr/>
-            </p:nvCxnSpPr>
-            <p:spPr>
-              <a:xfrm rot="5400000">
-                <a:off x="4357283" y="5395131"/>
-                <a:ext cx="400020" cy="624359"/>
-              </a:xfrm>
-              <a:prstGeom prst="bentConnector3">
-                <a:avLst>
-                  <a:gd name="adj1" fmla="val 50000"/>
-                </a:avLst>
-              </a:prstGeom>
-              <a:ln w="12700">
-                <a:solidFill>
-                  <a:schemeClr val="tx1"/>
-                </a:solidFill>
-              </a:ln>
-            </p:spPr>
-            <p:style>
-              <a:lnRef idx="1">
-                <a:schemeClr val="accent1"/>
-              </a:lnRef>
-              <a:fillRef idx="0">
-                <a:schemeClr val="accent1"/>
-              </a:fillRef>
-              <a:effectRef idx="0">
-                <a:schemeClr val="accent1"/>
-              </a:effectRef>
-              <a:fontRef idx="minor">
-                <a:schemeClr val="tx1"/>
-              </a:fontRef>
-            </p:style>
-          </p:cxnSp>
-        </p:grpSp>
-        <p:sp>
-          <p:nvSpPr>
-            <p:cNvPr id="72" name="Señal de prohibido 71"/>
-            <p:cNvSpPr/>
-            <p:nvPr/>
-          </p:nvSpPr>
-          <p:spPr>
-            <a:xfrm>
-              <a:off x="3605349" y="4728754"/>
-              <a:ext cx="2006718" cy="1919897"/>
-            </a:xfrm>
-            <a:prstGeom prst="noSmoking">
-              <a:avLst>
-                <a:gd name="adj" fmla="val 11214"/>
-              </a:avLst>
-            </a:prstGeom>
-            <a:solidFill>
-              <a:srgbClr val="FF0000"/>
-            </a:solidFill>
-          </p:spPr>
-          <p:style>
-            <a:lnRef idx="2">
-              <a:schemeClr val="accent1">
-                <a:shade val="50000"/>
-              </a:schemeClr>
-            </a:lnRef>
-            <a:fillRef idx="1">
-              <a:schemeClr val="accent1"/>
-            </a:fillRef>
-            <a:effectRef idx="0">
-              <a:schemeClr val="accent1"/>
-            </a:effectRef>
-            <a:fontRef idx="minor">
-              <a:schemeClr val="lt1"/>
-            </a:fontRef>
-          </p:style>
-          <p:txBody>
-            <a:bodyPr rtlCol="0" anchor="ctr"/>
-            <a:lstStyle/>
-            <a:p>
-              <a:pPr algn="ctr"/>
-              <a:endParaRPr lang="es-ES">
-                <a:solidFill>
-                  <a:schemeClr val="tx1"/>
-                </a:solidFill>
-              </a:endParaRPr>
-            </a:p>
-          </p:txBody>
-        </p:sp>
-      </p:grpSp>
-    </p:spTree>
-    <p:extLst>
-      <p:ext uri="{BB962C8B-B14F-4D97-AF65-F5344CB8AC3E}">
-        <p14:creationId xmlns:p14="http://schemas.microsoft.com/office/powerpoint/2010/main" val="810938426"/>
       </p:ext>
     </p:extLst>
   </p:cSld>

</xml_diff>